<commit_message>
- Added explanation of GateTime on Drum ch
</commit_message>
<xml_diff>
--- a/docs/MAmidiMEmo/OpManual_ja.pptx
+++ b/docs/MAmidiMEmo/OpManual_ja.pptx
@@ -5,22 +5,24 @@
     <p:sldMasterId id="2147483678" r:id="rId1"/>
   </p:sldMasterIdLst>
   <p:notesMasterIdLst>
-    <p:notesMasterId r:id="rId15"/>
+    <p:notesMasterId r:id="rId17"/>
   </p:notesMasterIdLst>
   <p:sldIdLst>
-    <p:sldId id="310" r:id="rId2"/>
-    <p:sldId id="309" r:id="rId3"/>
-    <p:sldId id="293" r:id="rId4"/>
-    <p:sldId id="294" r:id="rId5"/>
-    <p:sldId id="298" r:id="rId6"/>
-    <p:sldId id="300" r:id="rId7"/>
-    <p:sldId id="304" r:id="rId8"/>
-    <p:sldId id="305" r:id="rId9"/>
-    <p:sldId id="306" r:id="rId10"/>
-    <p:sldId id="307" r:id="rId11"/>
-    <p:sldId id="302" r:id="rId12"/>
-    <p:sldId id="303" r:id="rId13"/>
-    <p:sldId id="308" r:id="rId14"/>
+    <p:sldId id="312" r:id="rId2"/>
+    <p:sldId id="310" r:id="rId3"/>
+    <p:sldId id="309" r:id="rId4"/>
+    <p:sldId id="293" r:id="rId5"/>
+    <p:sldId id="294" r:id="rId6"/>
+    <p:sldId id="298" r:id="rId7"/>
+    <p:sldId id="300" r:id="rId8"/>
+    <p:sldId id="304" r:id="rId9"/>
+    <p:sldId id="305" r:id="rId10"/>
+    <p:sldId id="306" r:id="rId11"/>
+    <p:sldId id="307" r:id="rId12"/>
+    <p:sldId id="311" r:id="rId13"/>
+    <p:sldId id="302" r:id="rId14"/>
+    <p:sldId id="303" r:id="rId15"/>
+    <p:sldId id="308" r:id="rId16"/>
   </p:sldIdLst>
   <p:sldSz cx="12192000" cy="6858000"/>
   <p:notesSz cx="6858000" cy="9144000"/>
@@ -209,7 +211,7 @@
           <a:p>
             <a:fld id="{581C28D8-13B6-41C3-9F5F-0284C569C6F1}" type="datetimeFigureOut">
               <a:rPr kumimoji="1" lang="ja-JP" altLang="en-US" smtClean="0"/>
-              <a:t>2023/5/13</a:t>
+              <a:t>2024/4/5</a:t>
             </a:fld>
             <a:endParaRPr kumimoji="1" lang="ja-JP" altLang="en-US"/>
           </a:p>
@@ -573,7 +575,7 @@
           <a:p>
             <a:fld id="{E8D2F5C4-CB40-44D3-9C89-5ECCD9AB4B5C}" type="slidenum">
               <a:rPr kumimoji="1" lang="ja-JP" altLang="en-US" smtClean="0"/>
-              <a:t>1</a:t>
+              <a:t>2</a:t>
             </a:fld>
             <a:endParaRPr kumimoji="1" lang="ja-JP" altLang="en-US"/>
           </a:p>
@@ -657,7 +659,7 @@
           <a:p>
             <a:fld id="{E8D2F5C4-CB40-44D3-9C89-5ECCD9AB4B5C}" type="slidenum">
               <a:rPr kumimoji="1" lang="ja-JP" altLang="en-US" smtClean="0"/>
-              <a:t>2</a:t>
+              <a:t>3</a:t>
             </a:fld>
             <a:endParaRPr kumimoji="1" lang="ja-JP" altLang="en-US"/>
           </a:p>
@@ -741,7 +743,7 @@
           <a:p>
             <a:fld id="{E8D2F5C4-CB40-44D3-9C89-5ECCD9AB4B5C}" type="slidenum">
               <a:rPr kumimoji="1" lang="ja-JP" altLang="en-US" smtClean="0"/>
-              <a:t>4</a:t>
+              <a:t>5</a:t>
             </a:fld>
             <a:endParaRPr kumimoji="1" lang="ja-JP" altLang="en-US"/>
           </a:p>
@@ -825,7 +827,7 @@
           <a:p>
             <a:fld id="{E8D2F5C4-CB40-44D3-9C89-5ECCD9AB4B5C}" type="slidenum">
               <a:rPr kumimoji="1" lang="ja-JP" altLang="en-US" smtClean="0"/>
-              <a:t>10</a:t>
+              <a:t>11</a:t>
             </a:fld>
             <a:endParaRPr kumimoji="1" lang="ja-JP" altLang="en-US"/>
           </a:p>
@@ -909,7 +911,7 @@
           <a:p>
             <a:fld id="{E8D2F5C4-CB40-44D3-9C89-5ECCD9AB4B5C}" type="slidenum">
               <a:rPr kumimoji="1" lang="ja-JP" altLang="en-US" smtClean="0"/>
-              <a:t>12</a:t>
+              <a:t>14</a:t>
             </a:fld>
             <a:endParaRPr kumimoji="1" lang="ja-JP" altLang="en-US"/>
           </a:p>
@@ -1116,7 +1118,7 @@
           <a:p>
             <a:fld id="{B8625E62-B904-4691-B75E-EC1C32885285}" type="datetime1">
               <a:rPr kumimoji="1" lang="ja-JP" altLang="en-US" smtClean="0"/>
-              <a:t>2023/5/13</a:t>
+              <a:t>2024/4/5</a:t>
             </a:fld>
             <a:endParaRPr kumimoji="1" lang="ja-JP" altLang="en-US"/>
           </a:p>
@@ -1454,7 +1456,7 @@
           <a:p>
             <a:fld id="{A4C87007-2A40-4EFC-90A3-258EFA3C1001}" type="datetime1">
               <a:rPr kumimoji="1" lang="ja-JP" altLang="en-US" smtClean="0"/>
-              <a:t>2023/5/13</a:t>
+              <a:t>2024/4/5</a:t>
             </a:fld>
             <a:endParaRPr kumimoji="1" lang="ja-JP" altLang="en-US"/>
           </a:p>
@@ -1855,7 +1857,7 @@
           <a:p>
             <a:fld id="{0FE0D7FF-9203-4AA3-90FD-622674A14F90}" type="datetime1">
               <a:rPr kumimoji="1" lang="ja-JP" altLang="en-US" smtClean="0"/>
-              <a:t>2023/5/13</a:t>
+              <a:t>2024/4/5</a:t>
             </a:fld>
             <a:endParaRPr kumimoji="1" lang="ja-JP" altLang="en-US"/>
           </a:p>
@@ -2191,7 +2193,7 @@
           <a:p>
             <a:fld id="{D2D6E4D3-BEDB-4F35-876B-5B9AA41BFB5B}" type="datetime1">
               <a:rPr kumimoji="1" lang="ja-JP" altLang="en-US" smtClean="0"/>
-              <a:t>2023/5/13</a:t>
+              <a:t>2024/4/5</a:t>
             </a:fld>
             <a:endParaRPr kumimoji="1" lang="ja-JP" altLang="en-US"/>
           </a:p>
@@ -2511,7 +2513,7 @@
           <a:p>
             <a:fld id="{2ACD896E-FC14-4F25-BC47-18ABAEA9E1FE}" type="datetime1">
               <a:rPr kumimoji="1" lang="ja-JP" altLang="en-US" smtClean="0"/>
-              <a:t>2023/5/13</a:t>
+              <a:t>2024/4/5</a:t>
             </a:fld>
             <a:endParaRPr kumimoji="1" lang="ja-JP" altLang="en-US"/>
           </a:p>
@@ -2907,7 +2909,7 @@
           <a:p>
             <a:fld id="{54FC701B-2185-4987-B8E2-5507664B65F4}" type="datetime1">
               <a:rPr kumimoji="1" lang="ja-JP" altLang="en-US" smtClean="0"/>
-              <a:t>2023/5/13</a:t>
+              <a:t>2024/4/5</a:t>
             </a:fld>
             <a:endParaRPr kumimoji="1" lang="ja-JP" altLang="en-US"/>
           </a:p>
@@ -3196,7 +3198,7 @@
           <a:p>
             <a:fld id="{3FB4CDED-9617-418F-B546-D66B9BB6C35E}" type="datetime1">
               <a:rPr kumimoji="1" lang="ja-JP" altLang="en-US" smtClean="0"/>
-              <a:t>2023/5/13</a:t>
+              <a:t>2024/4/5</a:t>
             </a:fld>
             <a:endParaRPr kumimoji="1" lang="ja-JP" altLang="en-US"/>
           </a:p>
@@ -3490,7 +3492,7 @@
           <a:p>
             <a:fld id="{F5635D40-962A-46D7-8037-3F2900B5EB4D}" type="datetime1">
               <a:rPr kumimoji="1" lang="ja-JP" altLang="en-US" smtClean="0"/>
-              <a:t>2023/5/13</a:t>
+              <a:t>2024/4/5</a:t>
             </a:fld>
             <a:endParaRPr kumimoji="1" lang="ja-JP" altLang="en-US"/>
           </a:p>
@@ -3784,7 +3786,7 @@
           <a:p>
             <a:fld id="{741DA9A2-8356-4FFD-B66A-E38811049858}" type="datetime1">
               <a:rPr kumimoji="1" lang="ja-JP" altLang="en-US" smtClean="0"/>
-              <a:t>2023/5/13</a:t>
+              <a:t>2024/4/5</a:t>
             </a:fld>
             <a:endParaRPr kumimoji="1" lang="ja-JP" altLang="en-US"/>
           </a:p>
@@ -4113,7 +4115,7 @@
           <a:p>
             <a:fld id="{9DDE8989-88B8-4869-97D9-547531F13E13}" type="datetime1">
               <a:rPr kumimoji="1" lang="ja-JP" altLang="en-US" smtClean="0"/>
-              <a:t>2023/5/13</a:t>
+              <a:t>2024/4/5</a:t>
             </a:fld>
             <a:endParaRPr kumimoji="1" lang="ja-JP" altLang="en-US"/>
           </a:p>
@@ -4500,7 +4502,7 @@
           <a:p>
             <a:fld id="{81EC4031-B949-4300-AB3E-1551426E8631}" type="datetime1">
               <a:rPr kumimoji="1" lang="ja-JP" altLang="en-US" smtClean="0"/>
-              <a:t>2023/5/13</a:t>
+              <a:t>2024/4/5</a:t>
             </a:fld>
             <a:endParaRPr kumimoji="1" lang="ja-JP" altLang="en-US"/>
           </a:p>
@@ -5021,7 +5023,7 @@
           <a:p>
             <a:fld id="{F39E755E-A59D-4634-B604-E9BB568B1156}" type="datetime1">
               <a:rPr kumimoji="1" lang="ja-JP" altLang="en-US" smtClean="0"/>
-              <a:t>2023/5/13</a:t>
+              <a:t>2024/4/5</a:t>
             </a:fld>
             <a:endParaRPr kumimoji="1" lang="ja-JP" altLang="en-US"/>
           </a:p>
@@ -5226,7 +5228,7 @@
           <a:p>
             <a:fld id="{61DA38B3-7601-4256-ABFE-386B92B0EDB5}" type="datetime1">
               <a:rPr kumimoji="1" lang="ja-JP" altLang="en-US" smtClean="0"/>
-              <a:t>2023/5/13</a:t>
+              <a:t>2024/4/5</a:t>
             </a:fld>
             <a:endParaRPr kumimoji="1" lang="ja-JP" altLang="en-US"/>
           </a:p>
@@ -5403,7 +5405,7 @@
           <a:p>
             <a:fld id="{5A28ED6D-8A94-4DBA-8EF2-284D1A467CE8}" type="datetime1">
               <a:rPr kumimoji="1" lang="ja-JP" altLang="en-US" smtClean="0"/>
-              <a:t>2023/5/13</a:t>
+              <a:t>2024/4/5</a:t>
             </a:fld>
             <a:endParaRPr kumimoji="1" lang="ja-JP" altLang="en-US"/>
           </a:p>
@@ -5768,7 +5770,7 @@
           <a:p>
             <a:fld id="{B27B0317-28AF-43C5-8944-AADFA89E0149}" type="datetime1">
               <a:rPr kumimoji="1" lang="ja-JP" altLang="en-US" smtClean="0"/>
-              <a:t>2023/5/13</a:t>
+              <a:t>2024/4/5</a:t>
             </a:fld>
             <a:endParaRPr kumimoji="1" lang="ja-JP" altLang="en-US"/>
           </a:p>
@@ -6113,7 +6115,7 @@
           <a:p>
             <a:fld id="{A78D023C-C4FA-4CE8-B5BE-6798898EE377}" type="datetime1">
               <a:rPr kumimoji="1" lang="ja-JP" altLang="en-US" smtClean="0"/>
-              <a:t>2023/5/13</a:t>
+              <a:t>2024/4/5</a:t>
             </a:fld>
             <a:endParaRPr kumimoji="1" lang="ja-JP" altLang="en-US"/>
           </a:p>
@@ -8262,7 +8264,7 @@
           <a:p>
             <a:fld id="{99567159-F4A8-4352-915B-DDBEFEF4A4D6}" type="datetime1">
               <a:rPr kumimoji="1" lang="ja-JP" altLang="en-US" smtClean="0"/>
-              <a:t>2023/5/13</a:t>
+              <a:t>2024/4/5</a:t>
             </a:fld>
             <a:endParaRPr kumimoji="1" lang="ja-JP" altLang="en-US"/>
           </a:p>
@@ -8786,6 +8788,101 @@
           <p:cNvPr id="2" name="タイトル 1">
             <a:extLst>
               <a:ext uri="{FF2B5EF4-FFF2-40B4-BE49-F238E27FC236}">
+                <a16:creationId xmlns:a16="http://schemas.microsoft.com/office/drawing/2014/main" id="{92E03992-95A6-A859-B51B-EFB81165A67D}"/>
+              </a:ext>
+            </a:extLst>
+          </p:cNvPr>
+          <p:cNvSpPr>
+            <a:spLocks noGrp="1"/>
+          </p:cNvSpPr>
+          <p:nvPr>
+            <p:ph type="ctrTitle"/>
+          </p:nvPr>
+        </p:nvSpPr>
+        <p:spPr/>
+        <p:txBody>
+          <a:bodyPr/>
+          <a:lstStyle/>
+          <a:p>
+            <a:r>
+              <a:rPr lang="en-US" altLang="ja-JP" dirty="0" err="1"/>
+              <a:t>MAmidiMEmo</a:t>
+            </a:r>
+            <a:br>
+              <a:rPr lang="en-US" altLang="ja-JP" dirty="0"/>
+            </a:br>
+            <a:r>
+              <a:rPr lang="ja-JP" altLang="en-US" dirty="0"/>
+              <a:t>オペレーションマニュアル</a:t>
+            </a:r>
+            <a:endParaRPr kumimoji="1" lang="ja-JP" altLang="en-US" dirty="0"/>
+          </a:p>
+        </p:txBody>
+      </p:sp>
+      <p:sp>
+        <p:nvSpPr>
+          <p:cNvPr id="3" name="字幕 2">
+            <a:extLst>
+              <a:ext uri="{FF2B5EF4-FFF2-40B4-BE49-F238E27FC236}">
+                <a16:creationId xmlns:a16="http://schemas.microsoft.com/office/drawing/2014/main" id="{FAA8A483-4B38-3735-4D06-039ABFB4E5E8}"/>
+              </a:ext>
+            </a:extLst>
+          </p:cNvPr>
+          <p:cNvSpPr>
+            <a:spLocks noGrp="1"/>
+          </p:cNvSpPr>
+          <p:nvPr>
+            <p:ph type="subTitle" idx="1"/>
+          </p:nvPr>
+        </p:nvSpPr>
+        <p:spPr/>
+        <p:txBody>
+          <a:bodyPr/>
+          <a:lstStyle/>
+          <a:p>
+            <a:r>
+              <a:rPr kumimoji="1" lang="en-US" altLang="ja-JP" dirty="0"/>
+              <a:t>V1.0.0</a:t>
+            </a:r>
+            <a:endParaRPr kumimoji="1" lang="ja-JP" altLang="en-US" dirty="0"/>
+          </a:p>
+        </p:txBody>
+      </p:sp>
+    </p:spTree>
+    <p:extLst>
+      <p:ext uri="{BB962C8B-B14F-4D97-AF65-F5344CB8AC3E}">
+        <p14:creationId xmlns:p14="http://schemas.microsoft.com/office/powerpoint/2010/main" val="1170080935"/>
+      </p:ext>
+    </p:extLst>
+  </p:cSld>
+  <p:clrMapOvr>
+    <a:masterClrMapping/>
+  </p:clrMapOvr>
+</p:sld>
+</file>
+
+<file path=ppt/slides/slide10.xml><?xml version="1.0" encoding="utf-8"?>
+<p:sld xmlns:a="http://schemas.openxmlformats.org/drawingml/2006/main" xmlns:r="http://schemas.openxmlformats.org/officeDocument/2006/relationships" xmlns:p="http://schemas.openxmlformats.org/presentationml/2006/main">
+  <p:cSld>
+    <p:spTree>
+      <p:nvGrpSpPr>
+        <p:cNvPr id="1" name=""/>
+        <p:cNvGrpSpPr/>
+        <p:nvPr/>
+      </p:nvGrpSpPr>
+      <p:grpSpPr>
+        <a:xfrm>
+          <a:off x="0" y="0"/>
+          <a:ext cx="0" cy="0"/>
+          <a:chOff x="0" y="0"/>
+          <a:chExt cx="0" cy="0"/>
+        </a:xfrm>
+      </p:grpSpPr>
+      <p:sp>
+        <p:nvSpPr>
+          <p:cNvPr id="2" name="タイトル 1">
+            <a:extLst>
+              <a:ext uri="{FF2B5EF4-FFF2-40B4-BE49-F238E27FC236}">
                 <a16:creationId xmlns:a16="http://schemas.microsoft.com/office/drawing/2014/main" id="{F865C3BD-EF86-B649-E99B-4BA2FE5082BB}"/>
               </a:ext>
             </a:extLst>
@@ -8799,16 +8896,45 @@
         </p:nvSpPr>
         <p:spPr/>
         <p:txBody>
-          <a:bodyPr/>
+          <a:bodyPr>
+            <a:normAutofit fontScale="90000"/>
+          </a:bodyPr>
           <a:lstStyle/>
           <a:p>
             <a:r>
+              <a:rPr kumimoji="1" lang="ja-JP" altLang="en-US" b="1" dirty="0"/>
+              <a:t>音色設定</a:t>
+            </a:r>
+            <a:r>
+              <a:rPr kumimoji="1" lang="en-US" altLang="ja-JP" b="1" dirty="0"/>
+              <a:t>4(</a:t>
+            </a:r>
+            <a:r>
+              <a:rPr kumimoji="1" lang="ja-JP" altLang="en-US" b="1" dirty="0"/>
+              <a:t>エキスパート向け</a:t>
+            </a:r>
+            <a:r>
+              <a:rPr kumimoji="1" lang="en-US" altLang="ja-JP" b="1" dirty="0"/>
+              <a:t>)</a:t>
+            </a:r>
+            <a:br>
+              <a:rPr kumimoji="1" lang="en-US" altLang="ja-JP" b="1" dirty="0"/>
+            </a:br>
+            <a:r>
               <a:rPr kumimoji="1" lang="en-US" altLang="ja-JP" dirty="0"/>
-              <a:t>SPFM</a:t>
+              <a:t>MIDI</a:t>
             </a:r>
             <a:r>
               <a:rPr kumimoji="1" lang="ja-JP" altLang="en-US" dirty="0"/>
-              <a:t>をセットアップする</a:t>
+              <a:t>キーボードのノブ</a:t>
+            </a:r>
+            <a:r>
+              <a:rPr kumimoji="1" lang="en-US" altLang="ja-JP" dirty="0"/>
+              <a:t>/</a:t>
+            </a:r>
+            <a:r>
+              <a:rPr kumimoji="1" lang="ja-JP" altLang="en-US" dirty="0"/>
+              <a:t>スライダなどに音色の変更機能を割り当てられます</a:t>
             </a:r>
           </a:p>
         </p:txBody>
@@ -8836,7 +8962,2048 @@
           <a:p>
             <a:fld id="{E27E2812-4560-4165-A7C7-9C013F955547}" type="slidenum">
               <a:rPr kumimoji="1" lang="ja-JP" altLang="en-US" smtClean="0"/>
-              <a:t>1</a:t>
+              <a:t>10</a:t>
+            </a:fld>
+            <a:endParaRPr kumimoji="1" lang="ja-JP" altLang="en-US"/>
+          </a:p>
+        </p:txBody>
+      </p:sp>
+      <p:pic>
+        <p:nvPicPr>
+          <p:cNvPr id="17" name="図 16">
+            <a:extLst>
+              <a:ext uri="{FF2B5EF4-FFF2-40B4-BE49-F238E27FC236}">
+                <a16:creationId xmlns:a16="http://schemas.microsoft.com/office/drawing/2014/main" id="{E3B92811-16A6-284B-9E38-43F1F1F995B5}"/>
+              </a:ext>
+            </a:extLst>
+          </p:cNvPr>
+          <p:cNvPicPr>
+            <a:picLocks noChangeAspect="1"/>
+          </p:cNvPicPr>
+          <p:nvPr/>
+        </p:nvPicPr>
+        <p:blipFill>
+          <a:blip r:embed="rId2"/>
+          <a:stretch>
+            <a:fillRect/>
+          </a:stretch>
+        </p:blipFill>
+        <p:spPr>
+          <a:xfrm>
+            <a:off x="821430" y="2265871"/>
+            <a:ext cx="5025459" cy="4368325"/>
+          </a:xfrm>
+          <a:prstGeom prst="rect">
+            <a:avLst/>
+          </a:prstGeom>
+        </p:spPr>
+      </p:pic>
+      <p:sp>
+        <p:nvSpPr>
+          <p:cNvPr id="18" name="四角形: 角を丸くする 17">
+            <a:extLst>
+              <a:ext uri="{FF2B5EF4-FFF2-40B4-BE49-F238E27FC236}">
+                <a16:creationId xmlns:a16="http://schemas.microsoft.com/office/drawing/2014/main" id="{5AA9C2C8-329C-24FA-58B6-E0C6EC79EA78}"/>
+              </a:ext>
+            </a:extLst>
+          </p:cNvPr>
+          <p:cNvSpPr/>
+          <p:nvPr/>
+        </p:nvSpPr>
+        <p:spPr>
+          <a:xfrm>
+            <a:off x="2062700" y="2900958"/>
+            <a:ext cx="3676742" cy="612868"/>
+          </a:xfrm>
+          <a:prstGeom prst="roundRect">
+            <a:avLst/>
+          </a:prstGeom>
+          <a:noFill/>
+          <a:ln w="76200" cap="flat" cmpd="sng" algn="ctr">
+            <a:solidFill>
+              <a:schemeClr val="accent1"/>
+            </a:solidFill>
+            <a:prstDash val="solid"/>
+            <a:round/>
+            <a:headEnd type="none" w="med" len="med"/>
+            <a:tailEnd type="none" w="med" len="med"/>
+          </a:ln>
+        </p:spPr>
+        <p:style>
+          <a:lnRef idx="0">
+            <a:scrgbClr r="0" g="0" b="0"/>
+          </a:lnRef>
+          <a:fillRef idx="0">
+            <a:scrgbClr r="0" g="0" b="0"/>
+          </a:fillRef>
+          <a:effectRef idx="0">
+            <a:scrgbClr r="0" g="0" b="0"/>
+          </a:effectRef>
+          <a:fontRef idx="minor">
+            <a:schemeClr val="accent1"/>
+          </a:fontRef>
+        </p:style>
+        <p:txBody>
+          <a:bodyPr rtlCol="0" anchor="ctr"/>
+          <a:lstStyle/>
+          <a:p>
+            <a:pPr algn="ctr"/>
+            <a:endParaRPr kumimoji="1" lang="ja-JP" altLang="en-US"/>
+          </a:p>
+        </p:txBody>
+      </p:sp>
+      <p:sp>
+        <p:nvSpPr>
+          <p:cNvPr id="19" name="吹き出し: 四角形 18">
+            <a:extLst>
+              <a:ext uri="{FF2B5EF4-FFF2-40B4-BE49-F238E27FC236}">
+                <a16:creationId xmlns:a16="http://schemas.microsoft.com/office/drawing/2014/main" id="{18F6BCD0-1266-7731-09A3-21A25B249CA1}"/>
+              </a:ext>
+            </a:extLst>
+          </p:cNvPr>
+          <p:cNvSpPr/>
+          <p:nvPr/>
+        </p:nvSpPr>
+        <p:spPr>
+          <a:xfrm>
+            <a:off x="6268529" y="2858219"/>
+            <a:ext cx="3605841" cy="984849"/>
+          </a:xfrm>
+          <a:prstGeom prst="wedgeRectCallout">
+            <a:avLst>
+              <a:gd name="adj1" fmla="val -87978"/>
+              <a:gd name="adj2" fmla="val -19397"/>
+            </a:avLst>
+          </a:prstGeom>
+        </p:spPr>
+        <p:style>
+          <a:lnRef idx="1">
+            <a:schemeClr val="accent2"/>
+          </a:lnRef>
+          <a:fillRef idx="2">
+            <a:schemeClr val="accent2"/>
+          </a:fillRef>
+          <a:effectRef idx="1">
+            <a:schemeClr val="accent2"/>
+          </a:effectRef>
+          <a:fontRef idx="minor">
+            <a:schemeClr val="dk1"/>
+          </a:fontRef>
+        </p:style>
+        <p:txBody>
+          <a:bodyPr rtlCol="0" anchor="ctr"/>
+          <a:lstStyle/>
+          <a:p>
+            <a:pPr algn="ctr"/>
+            <a:r>
+              <a:rPr kumimoji="1" lang="en-US" altLang="ja-JP" dirty="0"/>
+              <a:t>CC#70</a:t>
+            </a:r>
+            <a:r>
+              <a:rPr kumimoji="1" lang="ja-JP" altLang="en-US" dirty="0"/>
+              <a:t>～</a:t>
+            </a:r>
+            <a:r>
+              <a:rPr kumimoji="1" lang="en-US" altLang="ja-JP" dirty="0"/>
+              <a:t>79</a:t>
+            </a:r>
+            <a:r>
+              <a:rPr kumimoji="1" lang="ja-JP" altLang="en-US" dirty="0"/>
+              <a:t>のメッセージを送る事で、ここに記載した音色レジスタなどの値を変更できます</a:t>
+            </a:r>
+          </a:p>
+        </p:txBody>
+      </p:sp>
+      <p:sp>
+        <p:nvSpPr>
+          <p:cNvPr id="20" name="吹き出し: 四角形 19">
+            <a:extLst>
+              <a:ext uri="{FF2B5EF4-FFF2-40B4-BE49-F238E27FC236}">
+                <a16:creationId xmlns:a16="http://schemas.microsoft.com/office/drawing/2014/main" id="{808639A7-685C-36FD-DF8F-150EAA5C27E5}"/>
+              </a:ext>
+            </a:extLst>
+          </p:cNvPr>
+          <p:cNvSpPr/>
+          <p:nvPr/>
+        </p:nvSpPr>
+        <p:spPr>
+          <a:xfrm>
+            <a:off x="6159261" y="4313208"/>
+            <a:ext cx="5555411" cy="2191109"/>
+          </a:xfrm>
+          <a:prstGeom prst="wedgeRectCallout">
+            <a:avLst>
+              <a:gd name="adj1" fmla="val -80250"/>
+              <a:gd name="adj2" fmla="val -94296"/>
+            </a:avLst>
+          </a:prstGeom>
+        </p:spPr>
+        <p:style>
+          <a:lnRef idx="1">
+            <a:schemeClr val="accent2"/>
+          </a:lnRef>
+          <a:fillRef idx="2">
+            <a:schemeClr val="accent2"/>
+          </a:fillRef>
+          <a:effectRef idx="1">
+            <a:schemeClr val="accent2"/>
+          </a:effectRef>
+          <a:fontRef idx="minor">
+            <a:schemeClr val="dk1"/>
+          </a:fontRef>
+        </p:style>
+        <p:txBody>
+          <a:bodyPr rtlCol="0" anchor="ctr"/>
+          <a:lstStyle/>
+          <a:p>
+            <a:pPr algn="ctr"/>
+            <a:r>
+              <a:rPr kumimoji="1" lang="ja-JP" altLang="en-US" dirty="0"/>
+              <a:t>例えば「</a:t>
+            </a:r>
+            <a:r>
+              <a:rPr kumimoji="1" lang="en-US" altLang="ja-JP" dirty="0"/>
+              <a:t>Ops[0].TL</a:t>
+            </a:r>
+            <a:r>
+              <a:rPr kumimoji="1" lang="ja-JP" altLang="en-US" dirty="0"/>
+              <a:t>」と書くと、</a:t>
+            </a:r>
+            <a:r>
+              <a:rPr kumimoji="1" lang="en-US" altLang="ja-JP" dirty="0"/>
+              <a:t>CC#70</a:t>
+            </a:r>
+            <a:r>
+              <a:rPr kumimoji="1" lang="ja-JP" altLang="en-US" dirty="0"/>
+              <a:t>の値に合わせてオペレータ</a:t>
+            </a:r>
+            <a:r>
+              <a:rPr kumimoji="1" lang="en-US" altLang="ja-JP" dirty="0"/>
+              <a:t>0</a:t>
+            </a:r>
+            <a:r>
+              <a:rPr kumimoji="1" lang="ja-JP" altLang="en-US" dirty="0"/>
+              <a:t>の</a:t>
+            </a:r>
+            <a:r>
+              <a:rPr kumimoji="1" lang="en-US" altLang="ja-JP" dirty="0"/>
+              <a:t>TL</a:t>
+            </a:r>
+            <a:r>
+              <a:rPr kumimoji="1" lang="ja-JP" altLang="en-US" dirty="0"/>
+              <a:t>値が変化します。</a:t>
+            </a:r>
+            <a:endParaRPr kumimoji="1" lang="en-US" altLang="ja-JP" dirty="0"/>
+          </a:p>
+          <a:p>
+            <a:pPr algn="ctr"/>
+            <a:r>
+              <a:rPr kumimoji="1" lang="ja-JP" altLang="en-US" dirty="0"/>
+              <a:t>四則演算も可能です。</a:t>
+            </a:r>
+            <a:endParaRPr kumimoji="1" lang="en-US" altLang="ja-JP" dirty="0"/>
+          </a:p>
+          <a:p>
+            <a:pPr algn="ctr"/>
+            <a:r>
+              <a:rPr kumimoji="1" lang="en-US" altLang="ja-JP" dirty="0"/>
+              <a:t>AMS/PMS</a:t>
+            </a:r>
+            <a:r>
+              <a:rPr kumimoji="1" lang="ja-JP" altLang="en-US" dirty="0"/>
+              <a:t>だけでなく、</a:t>
+            </a:r>
+            <a:r>
+              <a:rPr kumimoji="1" lang="en-US" altLang="ja-JP" dirty="0"/>
+              <a:t>ALG</a:t>
+            </a:r>
+            <a:r>
+              <a:rPr kumimoji="1" lang="ja-JP" altLang="en-US" dirty="0"/>
+              <a:t>なども記載できます。</a:t>
+            </a:r>
+            <a:endParaRPr kumimoji="1" lang="en-US" altLang="ja-JP" dirty="0"/>
+          </a:p>
+          <a:p>
+            <a:pPr algn="ctr"/>
+            <a:r>
+              <a:rPr kumimoji="1" lang="ja-JP" altLang="en-US" dirty="0"/>
+              <a:t>複数のレジスタを同時に変更したい場合は、カンマで区切っていれてください。</a:t>
+            </a:r>
+            <a:endParaRPr kumimoji="1" lang="en-US" altLang="ja-JP" dirty="0"/>
+          </a:p>
+          <a:p>
+            <a:pPr algn="ctr"/>
+            <a:endParaRPr kumimoji="1" lang="ja-JP" altLang="en-US" dirty="0"/>
+          </a:p>
+        </p:txBody>
+      </p:sp>
+    </p:spTree>
+    <p:extLst>
+      <p:ext uri="{BB962C8B-B14F-4D97-AF65-F5344CB8AC3E}">
+        <p14:creationId xmlns:p14="http://schemas.microsoft.com/office/powerpoint/2010/main" val="1712738226"/>
+      </p:ext>
+    </p:extLst>
+  </p:cSld>
+  <p:clrMapOvr>
+    <a:masterClrMapping/>
+  </p:clrMapOvr>
+</p:sld>
+</file>
+
+<file path=ppt/slides/slide11.xml><?xml version="1.0" encoding="utf-8"?>
+<p:sld xmlns:a="http://schemas.openxmlformats.org/drawingml/2006/main" xmlns:r="http://schemas.openxmlformats.org/officeDocument/2006/relationships" xmlns:p="http://schemas.openxmlformats.org/presentationml/2006/main">
+  <p:cSld>
+    <p:spTree>
+      <p:nvGrpSpPr>
+        <p:cNvPr id="1" name=""/>
+        <p:cNvGrpSpPr/>
+        <p:nvPr/>
+      </p:nvGrpSpPr>
+      <p:grpSpPr>
+        <a:xfrm>
+          <a:off x="0" y="0"/>
+          <a:ext cx="0" cy="0"/>
+          <a:chOff x="0" y="0"/>
+          <a:chExt cx="0" cy="0"/>
+        </a:xfrm>
+      </p:grpSpPr>
+      <p:sp>
+        <p:nvSpPr>
+          <p:cNvPr id="2" name="タイトル 1">
+            <a:extLst>
+              <a:ext uri="{FF2B5EF4-FFF2-40B4-BE49-F238E27FC236}">
+                <a16:creationId xmlns:a16="http://schemas.microsoft.com/office/drawing/2014/main" id="{F865C3BD-EF86-B649-E99B-4BA2FE5082BB}"/>
+              </a:ext>
+            </a:extLst>
+          </p:cNvPr>
+          <p:cNvSpPr>
+            <a:spLocks noGrp="1"/>
+          </p:cNvSpPr>
+          <p:nvPr>
+            <p:ph type="title"/>
+          </p:nvPr>
+        </p:nvSpPr>
+        <p:spPr/>
+        <p:txBody>
+          <a:bodyPr>
+            <a:normAutofit fontScale="90000"/>
+          </a:bodyPr>
+          <a:lstStyle/>
+          <a:p>
+            <a:r>
+              <a:rPr kumimoji="1" lang="ja-JP" altLang="en-US" b="1" dirty="0"/>
+              <a:t>音色設定</a:t>
+            </a:r>
+            <a:r>
+              <a:rPr kumimoji="1" lang="en-US" altLang="ja-JP" b="1" dirty="0"/>
+              <a:t>5(</a:t>
+            </a:r>
+            <a:r>
+              <a:rPr kumimoji="1" lang="ja-JP" altLang="en-US" b="1" dirty="0"/>
+              <a:t>エキスパート向け</a:t>
+            </a:r>
+            <a:r>
+              <a:rPr kumimoji="1" lang="en-US" altLang="ja-JP" b="1" dirty="0"/>
+              <a:t>)</a:t>
+            </a:r>
+            <a:br>
+              <a:rPr kumimoji="1" lang="en-US" altLang="ja-JP" b="1" dirty="0"/>
+            </a:br>
+            <a:r>
+              <a:rPr kumimoji="1" lang="ja-JP" altLang="en-US" dirty="0"/>
+              <a:t>ドラム</a:t>
+            </a:r>
+            <a:r>
+              <a:rPr kumimoji="1" lang="en-US" altLang="ja-JP" dirty="0" err="1"/>
+              <a:t>ch</a:t>
+            </a:r>
+            <a:r>
+              <a:rPr kumimoji="1" lang="en-US" altLang="ja-JP" dirty="0"/>
+              <a:t>(10ch)</a:t>
+            </a:r>
+            <a:r>
+              <a:rPr kumimoji="1" lang="ja-JP" altLang="en-US" dirty="0"/>
+              <a:t>用の音色や、複数音を合成させた</a:t>
+            </a:r>
+            <a:r>
+              <a:rPr lang="ja-JP" altLang="en-US" dirty="0"/>
+              <a:t>音色も設定できます</a:t>
+            </a:r>
+            <a:endParaRPr kumimoji="1" lang="ja-JP" altLang="en-US" dirty="0"/>
+          </a:p>
+        </p:txBody>
+      </p:sp>
+      <p:sp>
+        <p:nvSpPr>
+          <p:cNvPr id="4" name="スライド番号プレースホルダー 3">
+            <a:extLst>
+              <a:ext uri="{FF2B5EF4-FFF2-40B4-BE49-F238E27FC236}">
+                <a16:creationId xmlns:a16="http://schemas.microsoft.com/office/drawing/2014/main" id="{DE0557E0-CE7A-39C9-66C4-23CAC19221CE}"/>
+              </a:ext>
+            </a:extLst>
+          </p:cNvPr>
+          <p:cNvSpPr>
+            <a:spLocks noGrp="1"/>
+          </p:cNvSpPr>
+          <p:nvPr>
+            <p:ph type="sldNum" sz="quarter" idx="12"/>
+          </p:nvPr>
+        </p:nvSpPr>
+        <p:spPr/>
+        <p:txBody>
+          <a:bodyPr/>
+          <a:lstStyle/>
+          <a:p>
+            <a:fld id="{E27E2812-4560-4165-A7C7-9C013F955547}" type="slidenum">
+              <a:rPr kumimoji="1" lang="ja-JP" altLang="en-US" smtClean="0"/>
+              <a:t>11</a:t>
+            </a:fld>
+            <a:endParaRPr kumimoji="1" lang="ja-JP" altLang="en-US"/>
+          </a:p>
+        </p:txBody>
+      </p:sp>
+      <p:pic>
+        <p:nvPicPr>
+          <p:cNvPr id="9" name="図 8">
+            <a:extLst>
+              <a:ext uri="{FF2B5EF4-FFF2-40B4-BE49-F238E27FC236}">
+                <a16:creationId xmlns:a16="http://schemas.microsoft.com/office/drawing/2014/main" id="{828EE879-AA65-90CA-E280-EBFB14B970C1}"/>
+              </a:ext>
+            </a:extLst>
+          </p:cNvPr>
+          <p:cNvPicPr>
+            <a:picLocks noChangeAspect="1"/>
+          </p:cNvPicPr>
+          <p:nvPr/>
+        </p:nvPicPr>
+        <p:blipFill>
+          <a:blip r:embed="rId3"/>
+          <a:stretch>
+            <a:fillRect/>
+          </a:stretch>
+        </p:blipFill>
+        <p:spPr>
+          <a:xfrm>
+            <a:off x="1578521" y="2300724"/>
+            <a:ext cx="4999307" cy="2023985"/>
+          </a:xfrm>
+          <a:prstGeom prst="rect">
+            <a:avLst/>
+          </a:prstGeom>
+        </p:spPr>
+      </p:pic>
+      <p:pic>
+        <p:nvPicPr>
+          <p:cNvPr id="13" name="図 12">
+            <a:extLst>
+              <a:ext uri="{FF2B5EF4-FFF2-40B4-BE49-F238E27FC236}">
+                <a16:creationId xmlns:a16="http://schemas.microsoft.com/office/drawing/2014/main" id="{E7FCEE2F-8A35-BD6B-6490-34ECC2F8F9E7}"/>
+              </a:ext>
+            </a:extLst>
+          </p:cNvPr>
+          <p:cNvPicPr>
+            <a:picLocks noChangeAspect="1"/>
+          </p:cNvPicPr>
+          <p:nvPr/>
+        </p:nvPicPr>
+        <p:blipFill>
+          <a:blip r:embed="rId4"/>
+          <a:stretch>
+            <a:fillRect/>
+          </a:stretch>
+        </p:blipFill>
+        <p:spPr>
+          <a:xfrm>
+            <a:off x="4601192" y="4427877"/>
+            <a:ext cx="3658049" cy="2360750"/>
+          </a:xfrm>
+          <a:prstGeom prst="rect">
+            <a:avLst/>
+          </a:prstGeom>
+        </p:spPr>
+      </p:pic>
+      <p:pic>
+        <p:nvPicPr>
+          <p:cNvPr id="15" name="図 14">
+            <a:extLst>
+              <a:ext uri="{FF2B5EF4-FFF2-40B4-BE49-F238E27FC236}">
+                <a16:creationId xmlns:a16="http://schemas.microsoft.com/office/drawing/2014/main" id="{C30D2566-85DA-0938-C302-4EEF4208B611}"/>
+              </a:ext>
+            </a:extLst>
+          </p:cNvPr>
+          <p:cNvPicPr>
+            <a:picLocks noChangeAspect="1"/>
+          </p:cNvPicPr>
+          <p:nvPr/>
+        </p:nvPicPr>
+        <p:blipFill>
+          <a:blip r:embed="rId5"/>
+          <a:stretch>
+            <a:fillRect/>
+          </a:stretch>
+        </p:blipFill>
+        <p:spPr>
+          <a:xfrm>
+            <a:off x="775598" y="4812004"/>
+            <a:ext cx="3376583" cy="613924"/>
+          </a:xfrm>
+          <a:prstGeom prst="rect">
+            <a:avLst/>
+          </a:prstGeom>
+        </p:spPr>
+      </p:pic>
+      <p:sp>
+        <p:nvSpPr>
+          <p:cNvPr id="16" name="四角形: 角を丸くする 15">
+            <a:extLst>
+              <a:ext uri="{FF2B5EF4-FFF2-40B4-BE49-F238E27FC236}">
+                <a16:creationId xmlns:a16="http://schemas.microsoft.com/office/drawing/2014/main" id="{5E052F39-1068-F364-2285-A578AD3716CC}"/>
+              </a:ext>
+            </a:extLst>
+          </p:cNvPr>
+          <p:cNvSpPr/>
+          <p:nvPr/>
+        </p:nvSpPr>
+        <p:spPr>
+          <a:xfrm>
+            <a:off x="2760452" y="3214776"/>
+            <a:ext cx="2978989" cy="299049"/>
+          </a:xfrm>
+          <a:prstGeom prst="roundRect">
+            <a:avLst/>
+          </a:prstGeom>
+          <a:noFill/>
+          <a:ln w="76200" cap="flat" cmpd="sng" algn="ctr">
+            <a:solidFill>
+              <a:schemeClr val="accent1"/>
+            </a:solidFill>
+            <a:prstDash val="solid"/>
+            <a:round/>
+            <a:headEnd type="none" w="med" len="med"/>
+            <a:tailEnd type="none" w="med" len="med"/>
+          </a:ln>
+        </p:spPr>
+        <p:style>
+          <a:lnRef idx="0">
+            <a:scrgbClr r="0" g="0" b="0"/>
+          </a:lnRef>
+          <a:fillRef idx="0">
+            <a:scrgbClr r="0" g="0" b="0"/>
+          </a:fillRef>
+          <a:effectRef idx="0">
+            <a:scrgbClr r="0" g="0" b="0"/>
+          </a:effectRef>
+          <a:fontRef idx="minor">
+            <a:schemeClr val="accent1"/>
+          </a:fontRef>
+        </p:style>
+        <p:txBody>
+          <a:bodyPr rtlCol="0" anchor="ctr"/>
+          <a:lstStyle/>
+          <a:p>
+            <a:pPr algn="ctr"/>
+            <a:endParaRPr kumimoji="1" lang="ja-JP" altLang="en-US"/>
+          </a:p>
+        </p:txBody>
+      </p:sp>
+      <p:sp>
+        <p:nvSpPr>
+          <p:cNvPr id="18" name="吹き出し: 四角形 17">
+            <a:extLst>
+              <a:ext uri="{FF2B5EF4-FFF2-40B4-BE49-F238E27FC236}">
+                <a16:creationId xmlns:a16="http://schemas.microsoft.com/office/drawing/2014/main" id="{340FCEAA-1672-8630-C2A0-1971877156E2}"/>
+              </a:ext>
+            </a:extLst>
+          </p:cNvPr>
+          <p:cNvSpPr/>
+          <p:nvPr/>
+        </p:nvSpPr>
+        <p:spPr>
+          <a:xfrm>
+            <a:off x="7567615" y="2636263"/>
+            <a:ext cx="3605841" cy="984849"/>
+          </a:xfrm>
+          <a:prstGeom prst="wedgeRectCallout">
+            <a:avLst>
+              <a:gd name="adj1" fmla="val -105522"/>
+              <a:gd name="adj2" fmla="val 29070"/>
+            </a:avLst>
+          </a:prstGeom>
+        </p:spPr>
+        <p:style>
+          <a:lnRef idx="1">
+            <a:schemeClr val="accent2"/>
+          </a:lnRef>
+          <a:fillRef idx="2">
+            <a:schemeClr val="accent2"/>
+          </a:fillRef>
+          <a:effectRef idx="1">
+            <a:schemeClr val="accent2"/>
+          </a:effectRef>
+          <a:fontRef idx="minor">
+            <a:schemeClr val="dk1"/>
+          </a:fontRef>
+        </p:style>
+        <p:txBody>
+          <a:bodyPr rtlCol="0" anchor="ctr"/>
+          <a:lstStyle/>
+          <a:p>
+            <a:pPr algn="ctr"/>
+            <a:r>
+              <a:rPr kumimoji="1" lang="en-US" altLang="ja-JP" dirty="0"/>
+              <a:t>MIDI 10ch</a:t>
+            </a:r>
+            <a:r>
+              <a:rPr kumimoji="1" lang="ja-JP" altLang="en-US" dirty="0"/>
+              <a:t>の鍵盤</a:t>
+            </a:r>
+            <a:r>
+              <a:rPr kumimoji="1" lang="en-US" altLang="ja-JP" dirty="0"/>
+              <a:t>C-1</a:t>
+            </a:r>
+            <a:r>
+              <a:rPr kumimoji="1" lang="ja-JP" altLang="en-US" dirty="0"/>
+              <a:t>に、割り当てる音色を記載する</a:t>
+            </a:r>
+          </a:p>
+        </p:txBody>
+      </p:sp>
+      <p:sp>
+        <p:nvSpPr>
+          <p:cNvPr id="19" name="吹き出し: 四角形 18">
+            <a:extLst>
+              <a:ext uri="{FF2B5EF4-FFF2-40B4-BE49-F238E27FC236}">
+                <a16:creationId xmlns:a16="http://schemas.microsoft.com/office/drawing/2014/main" id="{A67F24AD-CD85-E061-B820-E923441A5455}"/>
+              </a:ext>
+            </a:extLst>
+          </p:cNvPr>
+          <p:cNvSpPr/>
+          <p:nvPr/>
+        </p:nvSpPr>
+        <p:spPr>
+          <a:xfrm>
+            <a:off x="6430215" y="3724280"/>
+            <a:ext cx="3605841" cy="984849"/>
+          </a:xfrm>
+          <a:prstGeom prst="wedgeRectCallout">
+            <a:avLst>
+              <a:gd name="adj1" fmla="val -138058"/>
+              <a:gd name="adj2" fmla="val 63522"/>
+            </a:avLst>
+          </a:prstGeom>
+        </p:spPr>
+        <p:style>
+          <a:lnRef idx="1">
+            <a:schemeClr val="accent2"/>
+          </a:lnRef>
+          <a:fillRef idx="2">
+            <a:schemeClr val="accent2"/>
+          </a:fillRef>
+          <a:effectRef idx="1">
+            <a:schemeClr val="accent2"/>
+          </a:effectRef>
+          <a:fontRef idx="minor">
+            <a:schemeClr val="dk1"/>
+          </a:fontRef>
+        </p:style>
+        <p:txBody>
+          <a:bodyPr rtlCol="0" anchor="ctr"/>
+          <a:lstStyle/>
+          <a:p>
+            <a:pPr algn="ctr"/>
+            <a:r>
+              <a:rPr kumimoji="1" lang="en-US" altLang="ja-JP" dirty="0"/>
+              <a:t>[</a:t>
+            </a:r>
+            <a:r>
+              <a:rPr kumimoji="1" lang="en-US" altLang="ja-JP" dirty="0" err="1"/>
+              <a:t>CombinedTimbre</a:t>
+            </a:r>
+            <a:r>
+              <a:rPr kumimoji="1" lang="en-US" altLang="ja-JP" dirty="0"/>
+              <a:t>]</a:t>
+            </a:r>
+            <a:r>
+              <a:rPr kumimoji="1" lang="ja-JP" altLang="en-US" dirty="0"/>
+              <a:t>で複数音色を同時に鳴らせます</a:t>
+            </a:r>
+          </a:p>
+        </p:txBody>
+      </p:sp>
+      <p:sp>
+        <p:nvSpPr>
+          <p:cNvPr id="20" name="四角形: 角を丸くする 19">
+            <a:extLst>
+              <a:ext uri="{FF2B5EF4-FFF2-40B4-BE49-F238E27FC236}">
+                <a16:creationId xmlns:a16="http://schemas.microsoft.com/office/drawing/2014/main" id="{9D2C2094-4745-A1D0-B17B-2A38120D94E4}"/>
+              </a:ext>
+            </a:extLst>
+          </p:cNvPr>
+          <p:cNvSpPr/>
+          <p:nvPr/>
+        </p:nvSpPr>
+        <p:spPr>
+          <a:xfrm>
+            <a:off x="3860395" y="5007090"/>
+            <a:ext cx="583572" cy="299049"/>
+          </a:xfrm>
+          <a:prstGeom prst="roundRect">
+            <a:avLst/>
+          </a:prstGeom>
+          <a:noFill/>
+          <a:ln w="76200" cap="flat" cmpd="sng" algn="ctr">
+            <a:solidFill>
+              <a:schemeClr val="accent1"/>
+            </a:solidFill>
+            <a:prstDash val="solid"/>
+            <a:round/>
+            <a:headEnd type="none" w="med" len="med"/>
+            <a:tailEnd type="none" w="med" len="med"/>
+          </a:ln>
+        </p:spPr>
+        <p:style>
+          <a:lnRef idx="0">
+            <a:scrgbClr r="0" g="0" b="0"/>
+          </a:lnRef>
+          <a:fillRef idx="0">
+            <a:scrgbClr r="0" g="0" b="0"/>
+          </a:fillRef>
+          <a:effectRef idx="0">
+            <a:scrgbClr r="0" g="0" b="0"/>
+          </a:effectRef>
+          <a:fontRef idx="minor">
+            <a:schemeClr val="accent1"/>
+          </a:fontRef>
+        </p:style>
+        <p:txBody>
+          <a:bodyPr rtlCol="0" anchor="ctr"/>
+          <a:lstStyle/>
+          <a:p>
+            <a:pPr algn="ctr"/>
+            <a:endParaRPr kumimoji="1" lang="ja-JP" altLang="en-US"/>
+          </a:p>
+        </p:txBody>
+      </p:sp>
+      <p:sp>
+        <p:nvSpPr>
+          <p:cNvPr id="21" name="四角形: 角を丸くする 20">
+            <a:extLst>
+              <a:ext uri="{FF2B5EF4-FFF2-40B4-BE49-F238E27FC236}">
+                <a16:creationId xmlns:a16="http://schemas.microsoft.com/office/drawing/2014/main" id="{3B5B9FF1-DECE-1BE2-1E44-F5DBF1582434}"/>
+              </a:ext>
+            </a:extLst>
+          </p:cNvPr>
+          <p:cNvSpPr/>
+          <p:nvPr/>
+        </p:nvSpPr>
+        <p:spPr>
+          <a:xfrm>
+            <a:off x="4443967" y="6256532"/>
+            <a:ext cx="1009440" cy="299049"/>
+          </a:xfrm>
+          <a:prstGeom prst="roundRect">
+            <a:avLst/>
+          </a:prstGeom>
+          <a:noFill/>
+          <a:ln w="76200" cap="flat" cmpd="sng" algn="ctr">
+            <a:solidFill>
+              <a:schemeClr val="accent1"/>
+            </a:solidFill>
+            <a:prstDash val="solid"/>
+            <a:round/>
+            <a:headEnd type="none" w="med" len="med"/>
+            <a:tailEnd type="none" w="med" len="med"/>
+          </a:ln>
+        </p:spPr>
+        <p:style>
+          <a:lnRef idx="0">
+            <a:scrgbClr r="0" g="0" b="0"/>
+          </a:lnRef>
+          <a:fillRef idx="0">
+            <a:scrgbClr r="0" g="0" b="0"/>
+          </a:fillRef>
+          <a:effectRef idx="0">
+            <a:scrgbClr r="0" g="0" b="0"/>
+          </a:effectRef>
+          <a:fontRef idx="minor">
+            <a:schemeClr val="accent1"/>
+          </a:fontRef>
+        </p:style>
+        <p:txBody>
+          <a:bodyPr rtlCol="0" anchor="ctr"/>
+          <a:lstStyle/>
+          <a:p>
+            <a:pPr algn="ctr"/>
+            <a:endParaRPr kumimoji="1" lang="ja-JP" altLang="en-US"/>
+          </a:p>
+        </p:txBody>
+      </p:sp>
+      <p:sp>
+        <p:nvSpPr>
+          <p:cNvPr id="22" name="四角形: 角を丸くする 21">
+            <a:extLst>
+              <a:ext uri="{FF2B5EF4-FFF2-40B4-BE49-F238E27FC236}">
+                <a16:creationId xmlns:a16="http://schemas.microsoft.com/office/drawing/2014/main" id="{B97C0151-74EC-C07F-10BC-31E2E6E94B0B}"/>
+              </a:ext>
+            </a:extLst>
+          </p:cNvPr>
+          <p:cNvSpPr/>
+          <p:nvPr/>
+        </p:nvSpPr>
+        <p:spPr>
+          <a:xfrm>
+            <a:off x="6430215" y="6043747"/>
+            <a:ext cx="1392579" cy="299049"/>
+          </a:xfrm>
+          <a:prstGeom prst="roundRect">
+            <a:avLst/>
+          </a:prstGeom>
+          <a:noFill/>
+          <a:ln w="76200" cap="flat" cmpd="sng" algn="ctr">
+            <a:solidFill>
+              <a:schemeClr val="accent1"/>
+            </a:solidFill>
+            <a:prstDash val="solid"/>
+            <a:round/>
+            <a:headEnd type="none" w="med" len="med"/>
+            <a:tailEnd type="none" w="med" len="med"/>
+          </a:ln>
+        </p:spPr>
+        <p:style>
+          <a:lnRef idx="0">
+            <a:scrgbClr r="0" g="0" b="0"/>
+          </a:lnRef>
+          <a:fillRef idx="0">
+            <a:scrgbClr r="0" g="0" b="0"/>
+          </a:fillRef>
+          <a:effectRef idx="0">
+            <a:scrgbClr r="0" g="0" b="0"/>
+          </a:effectRef>
+          <a:fontRef idx="minor">
+            <a:schemeClr val="accent1"/>
+          </a:fontRef>
+        </p:style>
+        <p:txBody>
+          <a:bodyPr rtlCol="0" anchor="ctr"/>
+          <a:lstStyle/>
+          <a:p>
+            <a:pPr algn="ctr"/>
+            <a:endParaRPr kumimoji="1" lang="ja-JP" altLang="en-US"/>
+          </a:p>
+        </p:txBody>
+      </p:sp>
+      <p:pic>
+        <p:nvPicPr>
+          <p:cNvPr id="24" name="図 23">
+            <a:extLst>
+              <a:ext uri="{FF2B5EF4-FFF2-40B4-BE49-F238E27FC236}">
+                <a16:creationId xmlns:a16="http://schemas.microsoft.com/office/drawing/2014/main" id="{C0D24139-D47F-9D38-6422-EF7794975587}"/>
+              </a:ext>
+            </a:extLst>
+          </p:cNvPr>
+          <p:cNvPicPr>
+            <a:picLocks noChangeAspect="1"/>
+          </p:cNvPicPr>
+          <p:nvPr/>
+        </p:nvPicPr>
+        <p:blipFill>
+          <a:blip r:embed="rId6"/>
+          <a:stretch>
+            <a:fillRect/>
+          </a:stretch>
+        </p:blipFill>
+        <p:spPr>
+          <a:xfrm>
+            <a:off x="8486027" y="5455497"/>
+            <a:ext cx="3562199" cy="1396608"/>
+          </a:xfrm>
+          <a:prstGeom prst="rect">
+            <a:avLst/>
+          </a:prstGeom>
+        </p:spPr>
+      </p:pic>
+      <p:sp>
+        <p:nvSpPr>
+          <p:cNvPr id="25" name="矢印: 右 24">
+            <a:extLst>
+              <a:ext uri="{FF2B5EF4-FFF2-40B4-BE49-F238E27FC236}">
+                <a16:creationId xmlns:a16="http://schemas.microsoft.com/office/drawing/2014/main" id="{F823E779-EFA9-D44D-84AE-959BD158EDC0}"/>
+              </a:ext>
+            </a:extLst>
+          </p:cNvPr>
+          <p:cNvSpPr/>
+          <p:nvPr/>
+        </p:nvSpPr>
+        <p:spPr>
+          <a:xfrm>
+            <a:off x="4277189" y="5357762"/>
+            <a:ext cx="333555" cy="495388"/>
+          </a:xfrm>
+          <a:prstGeom prst="rightArrow">
+            <a:avLst/>
+          </a:prstGeom>
+        </p:spPr>
+        <p:style>
+          <a:lnRef idx="2">
+            <a:schemeClr val="accent6">
+              <a:shade val="50000"/>
+            </a:schemeClr>
+          </a:lnRef>
+          <a:fillRef idx="1">
+            <a:schemeClr val="accent6"/>
+          </a:fillRef>
+          <a:effectRef idx="0">
+            <a:schemeClr val="accent6"/>
+          </a:effectRef>
+          <a:fontRef idx="minor">
+            <a:schemeClr val="lt1"/>
+          </a:fontRef>
+        </p:style>
+        <p:txBody>
+          <a:bodyPr rtlCol="0" anchor="ctr"/>
+          <a:lstStyle/>
+          <a:p>
+            <a:pPr algn="ctr"/>
+            <a:endParaRPr kumimoji="1" lang="ja-JP" altLang="en-US"/>
+          </a:p>
+        </p:txBody>
+      </p:sp>
+      <p:sp>
+        <p:nvSpPr>
+          <p:cNvPr id="26" name="吹き出し: 四角形 25">
+            <a:extLst>
+              <a:ext uri="{FF2B5EF4-FFF2-40B4-BE49-F238E27FC236}">
+                <a16:creationId xmlns:a16="http://schemas.microsoft.com/office/drawing/2014/main" id="{21A609EC-B12F-7157-38E7-C9119994B628}"/>
+              </a:ext>
+            </a:extLst>
+          </p:cNvPr>
+          <p:cNvSpPr/>
+          <p:nvPr/>
+        </p:nvSpPr>
+        <p:spPr>
+          <a:xfrm>
+            <a:off x="8367623" y="4646762"/>
+            <a:ext cx="3824377" cy="808734"/>
+          </a:xfrm>
+          <a:prstGeom prst="wedgeRectCallout">
+            <a:avLst>
+              <a:gd name="adj1" fmla="val 2762"/>
+              <a:gd name="adj2" fmla="val 70755"/>
+            </a:avLst>
+          </a:prstGeom>
+        </p:spPr>
+        <p:style>
+          <a:lnRef idx="1">
+            <a:schemeClr val="accent2"/>
+          </a:lnRef>
+          <a:fillRef idx="2">
+            <a:schemeClr val="accent2"/>
+          </a:fillRef>
+          <a:effectRef idx="1">
+            <a:schemeClr val="accent2"/>
+          </a:effectRef>
+          <a:fontRef idx="minor">
+            <a:schemeClr val="dk1"/>
+          </a:fontRef>
+        </p:style>
+        <p:txBody>
+          <a:bodyPr rtlCol="0" anchor="ctr"/>
+          <a:lstStyle/>
+          <a:p>
+            <a:pPr algn="ctr"/>
+            <a:r>
+              <a:rPr kumimoji="1" lang="ja-JP" altLang="en-US" sz="1400" dirty="0"/>
+              <a:t>プログラム番号</a:t>
+            </a:r>
+            <a:r>
+              <a:rPr kumimoji="1" lang="en-US" altLang="ja-JP" sz="1400" dirty="0"/>
+              <a:t>X</a:t>
+            </a:r>
+            <a:r>
+              <a:rPr kumimoji="1" lang="ja-JP" altLang="en-US" sz="1400" dirty="0"/>
+              <a:t>に、</a:t>
+            </a:r>
+            <a:r>
+              <a:rPr kumimoji="1" lang="en-US" altLang="ja-JP" sz="1400" dirty="0" err="1"/>
+              <a:t>TimbreX</a:t>
+            </a:r>
+            <a:r>
+              <a:rPr kumimoji="1" lang="ja-JP" altLang="en-US" sz="1400" dirty="0"/>
+              <a:t>ではなく、</a:t>
+            </a:r>
+            <a:r>
+              <a:rPr kumimoji="1" lang="en-US" altLang="ja-JP" sz="1400" dirty="0" err="1"/>
+              <a:t>CombinedTimbreX</a:t>
+            </a:r>
+            <a:r>
+              <a:rPr kumimoji="1" lang="ja-JP" altLang="en-US" sz="1400" dirty="0"/>
+              <a:t>を割り当てます。</a:t>
+            </a:r>
+            <a:r>
+              <a:rPr kumimoji="1" lang="en-US" altLang="ja-JP" sz="1400" dirty="0"/>
+              <a:t>(</a:t>
+            </a:r>
+            <a:r>
+              <a:rPr kumimoji="1" lang="ja-JP" altLang="en-US" sz="1400" dirty="0"/>
+              <a:t>バンクを切り替えている、とイメージしてください</a:t>
+            </a:r>
+            <a:r>
+              <a:rPr kumimoji="1" lang="en-US" altLang="ja-JP" sz="1400" dirty="0"/>
+              <a:t>)</a:t>
+            </a:r>
+            <a:endParaRPr kumimoji="1" lang="ja-JP" altLang="en-US" sz="1400" dirty="0"/>
+          </a:p>
+        </p:txBody>
+      </p:sp>
+      <p:sp>
+        <p:nvSpPr>
+          <p:cNvPr id="27" name="四角形: 角を丸くする 26">
+            <a:extLst>
+              <a:ext uri="{FF2B5EF4-FFF2-40B4-BE49-F238E27FC236}">
+                <a16:creationId xmlns:a16="http://schemas.microsoft.com/office/drawing/2014/main" id="{42BD069D-26CA-589B-2D68-FF50D43BD249}"/>
+              </a:ext>
+            </a:extLst>
+          </p:cNvPr>
+          <p:cNvSpPr/>
+          <p:nvPr/>
+        </p:nvSpPr>
+        <p:spPr>
+          <a:xfrm>
+            <a:off x="8643668" y="6481146"/>
+            <a:ext cx="2600937" cy="337224"/>
+          </a:xfrm>
+          <a:prstGeom prst="roundRect">
+            <a:avLst/>
+          </a:prstGeom>
+          <a:noFill/>
+          <a:ln w="76200" cap="flat" cmpd="sng" algn="ctr">
+            <a:solidFill>
+              <a:schemeClr val="accent1"/>
+            </a:solidFill>
+            <a:prstDash val="solid"/>
+            <a:round/>
+            <a:headEnd type="none" w="med" len="med"/>
+            <a:tailEnd type="none" w="med" len="med"/>
+          </a:ln>
+        </p:spPr>
+        <p:style>
+          <a:lnRef idx="0">
+            <a:scrgbClr r="0" g="0" b="0"/>
+          </a:lnRef>
+          <a:fillRef idx="0">
+            <a:scrgbClr r="0" g="0" b="0"/>
+          </a:fillRef>
+          <a:effectRef idx="0">
+            <a:scrgbClr r="0" g="0" b="0"/>
+          </a:effectRef>
+          <a:fontRef idx="minor">
+            <a:schemeClr val="accent1"/>
+          </a:fontRef>
+        </p:style>
+        <p:txBody>
+          <a:bodyPr rtlCol="0" anchor="ctr"/>
+          <a:lstStyle/>
+          <a:p>
+            <a:pPr algn="ctr"/>
+            <a:endParaRPr kumimoji="1" lang="ja-JP" altLang="en-US"/>
+          </a:p>
+        </p:txBody>
+      </p:sp>
+    </p:spTree>
+    <p:extLst>
+      <p:ext uri="{BB962C8B-B14F-4D97-AF65-F5344CB8AC3E}">
+        <p14:creationId xmlns:p14="http://schemas.microsoft.com/office/powerpoint/2010/main" val="2360931659"/>
+      </p:ext>
+    </p:extLst>
+  </p:cSld>
+  <p:clrMapOvr>
+    <a:masterClrMapping/>
+  </p:clrMapOvr>
+</p:sld>
+</file>
+
+<file path=ppt/slides/slide12.xml><?xml version="1.0" encoding="utf-8"?>
+<p:sld xmlns:a="http://schemas.openxmlformats.org/drawingml/2006/main" xmlns:r="http://schemas.openxmlformats.org/officeDocument/2006/relationships" xmlns:p="http://schemas.openxmlformats.org/presentationml/2006/main">
+  <p:cSld>
+    <p:spTree>
+      <p:nvGrpSpPr>
+        <p:cNvPr id="1" name=""/>
+        <p:cNvGrpSpPr/>
+        <p:nvPr/>
+      </p:nvGrpSpPr>
+      <p:grpSpPr>
+        <a:xfrm>
+          <a:off x="0" y="0"/>
+          <a:ext cx="0" cy="0"/>
+          <a:chOff x="0" y="0"/>
+          <a:chExt cx="0" cy="0"/>
+        </a:xfrm>
+      </p:grpSpPr>
+      <p:sp>
+        <p:nvSpPr>
+          <p:cNvPr id="2" name="タイトル 1">
+            <a:extLst>
+              <a:ext uri="{FF2B5EF4-FFF2-40B4-BE49-F238E27FC236}">
+                <a16:creationId xmlns:a16="http://schemas.microsoft.com/office/drawing/2014/main" id="{C0BBAF0B-CF42-C408-2A0C-8A5306A8970A}"/>
+              </a:ext>
+            </a:extLst>
+          </p:cNvPr>
+          <p:cNvSpPr>
+            <a:spLocks noGrp="1"/>
+          </p:cNvSpPr>
+          <p:nvPr>
+            <p:ph type="title"/>
+          </p:nvPr>
+        </p:nvSpPr>
+        <p:spPr/>
+        <p:txBody>
+          <a:bodyPr/>
+          <a:lstStyle/>
+          <a:p>
+            <a:r>
+              <a:rPr lang="ja-JP" altLang="en-US" dirty="0"/>
+              <a:t>ドラム</a:t>
+            </a:r>
+            <a:r>
+              <a:rPr lang="en-US" altLang="ja-JP" dirty="0" err="1"/>
+              <a:t>ch</a:t>
+            </a:r>
+            <a:r>
+              <a:rPr lang="ja-JP" altLang="en-US" dirty="0"/>
+              <a:t>のノートオフ制御</a:t>
+            </a:r>
+            <a:endParaRPr kumimoji="1" lang="ja-JP" altLang="en-US" dirty="0"/>
+          </a:p>
+        </p:txBody>
+      </p:sp>
+      <p:sp>
+        <p:nvSpPr>
+          <p:cNvPr id="3" name="コンテンツ プレースホルダー 2">
+            <a:extLst>
+              <a:ext uri="{FF2B5EF4-FFF2-40B4-BE49-F238E27FC236}">
+                <a16:creationId xmlns:a16="http://schemas.microsoft.com/office/drawing/2014/main" id="{CC21978C-C7FD-596E-1102-4F6F1890C534}"/>
+              </a:ext>
+            </a:extLst>
+          </p:cNvPr>
+          <p:cNvSpPr>
+            <a:spLocks noGrp="1"/>
+          </p:cNvSpPr>
+          <p:nvPr>
+            <p:ph idx="1"/>
+          </p:nvPr>
+        </p:nvSpPr>
+        <p:spPr/>
+        <p:txBody>
+          <a:bodyPr/>
+          <a:lstStyle/>
+          <a:p>
+            <a:r>
+              <a:rPr kumimoji="1" lang="ja-JP" altLang="en-US" dirty="0"/>
+              <a:t>ドラム</a:t>
+            </a:r>
+            <a:r>
+              <a:rPr kumimoji="1" lang="en-US" altLang="ja-JP" dirty="0" err="1"/>
+              <a:t>ch</a:t>
+            </a:r>
+            <a:r>
+              <a:rPr kumimoji="1" lang="en-US" altLang="ja-JP" dirty="0"/>
+              <a:t>(</a:t>
+            </a:r>
+            <a:r>
+              <a:rPr kumimoji="1" lang="ja-JP" altLang="en-US" dirty="0"/>
+              <a:t>通常</a:t>
+            </a:r>
+            <a:r>
+              <a:rPr kumimoji="1" lang="en-US" altLang="ja-JP" dirty="0"/>
+              <a:t>10ch)</a:t>
+            </a:r>
+            <a:r>
+              <a:rPr kumimoji="1" lang="ja-JP" altLang="en-US" dirty="0"/>
+              <a:t>は</a:t>
+            </a:r>
+            <a:r>
+              <a:rPr kumimoji="1" lang="en-US" altLang="ja-JP" dirty="0"/>
+              <a:t>(</a:t>
+            </a:r>
+            <a:r>
+              <a:rPr kumimoji="1" lang="ja-JP" altLang="en-US" dirty="0"/>
+              <a:t>デフォルトでは</a:t>
+            </a:r>
+            <a:r>
+              <a:rPr kumimoji="1" lang="en-US" altLang="ja-JP" dirty="0"/>
+              <a:t>)MIDI</a:t>
+            </a:r>
+            <a:r>
+              <a:rPr kumimoji="1" lang="ja-JP" altLang="en-US" dirty="0"/>
+              <a:t>のノートオフメッセージを受信してもノートオフ</a:t>
+            </a:r>
+            <a:r>
+              <a:rPr lang="ja-JP" altLang="en-US" dirty="0"/>
+              <a:t>せず、各音色のゲートタイム</a:t>
+            </a:r>
+            <a:r>
+              <a:rPr lang="en-US" altLang="ja-JP" dirty="0"/>
+              <a:t>(</a:t>
+            </a:r>
+            <a:r>
+              <a:rPr lang="en-US" altLang="ja-JP" dirty="0" err="1"/>
+              <a:t>GateTime</a:t>
+            </a:r>
+            <a:r>
+              <a:rPr lang="en-US" altLang="ja-JP" dirty="0"/>
+              <a:t>)</a:t>
+            </a:r>
+            <a:r>
+              <a:rPr lang="ja-JP" altLang="en-US" dirty="0"/>
+              <a:t>設定に合わせてノートオフします。</a:t>
+            </a:r>
+            <a:endParaRPr lang="en-US" altLang="ja-JP" dirty="0"/>
+          </a:p>
+          <a:p>
+            <a:r>
+              <a:rPr kumimoji="1" lang="ja-JP" altLang="en-US" dirty="0"/>
+              <a:t>これを</a:t>
+            </a:r>
+            <a:r>
+              <a:rPr kumimoji="1" lang="en-US" altLang="ja-JP" dirty="0"/>
+              <a:t>MIDI</a:t>
+            </a:r>
+            <a:r>
+              <a:rPr kumimoji="1" lang="ja-JP" altLang="en-US" dirty="0"/>
+              <a:t>のノートオフメッセージに合わせてノートオフするモードもあります。</a:t>
+            </a:r>
+            <a:endParaRPr kumimoji="1" lang="en-US" altLang="ja-JP" dirty="0"/>
+          </a:p>
+          <a:p>
+            <a:r>
+              <a:rPr kumimoji="1" lang="ja-JP" altLang="en-US" dirty="0"/>
+              <a:t>以下に解説動画を用意しましたので、ご参考ください。</a:t>
+            </a:r>
+            <a:r>
+              <a:rPr kumimoji="1" lang="en-US" altLang="ja-JP" dirty="0">
+                <a:hlinkClick r:id="rId2"/>
+              </a:rPr>
+              <a:t>https://youtu.be/wZeR3MJ7tRU</a:t>
+            </a:r>
+            <a:endParaRPr kumimoji="1" lang="en-US" altLang="ja-JP" dirty="0"/>
+          </a:p>
+          <a:p>
+            <a:endParaRPr kumimoji="1" lang="ja-JP" altLang="en-US" dirty="0"/>
+          </a:p>
+        </p:txBody>
+      </p:sp>
+      <p:sp>
+        <p:nvSpPr>
+          <p:cNvPr id="4" name="スライド番号プレースホルダー 3">
+            <a:extLst>
+              <a:ext uri="{FF2B5EF4-FFF2-40B4-BE49-F238E27FC236}">
+                <a16:creationId xmlns:a16="http://schemas.microsoft.com/office/drawing/2014/main" id="{A95139D1-E0D4-C4D7-54AA-63D14C727690}"/>
+              </a:ext>
+            </a:extLst>
+          </p:cNvPr>
+          <p:cNvSpPr>
+            <a:spLocks noGrp="1"/>
+          </p:cNvSpPr>
+          <p:nvPr>
+            <p:ph type="sldNum" sz="quarter" idx="12"/>
+          </p:nvPr>
+        </p:nvSpPr>
+        <p:spPr/>
+        <p:txBody>
+          <a:bodyPr/>
+          <a:lstStyle/>
+          <a:p>
+            <a:fld id="{E27E2812-4560-4165-A7C7-9C013F955547}" type="slidenum">
+              <a:rPr kumimoji="1" lang="ja-JP" altLang="en-US" smtClean="0"/>
+              <a:t>12</a:t>
+            </a:fld>
+            <a:endParaRPr kumimoji="1" lang="ja-JP" altLang="en-US"/>
+          </a:p>
+        </p:txBody>
+      </p:sp>
+    </p:spTree>
+    <p:extLst>
+      <p:ext uri="{BB962C8B-B14F-4D97-AF65-F5344CB8AC3E}">
+        <p14:creationId xmlns:p14="http://schemas.microsoft.com/office/powerpoint/2010/main" val="4268223489"/>
+      </p:ext>
+    </p:extLst>
+  </p:cSld>
+  <p:clrMapOvr>
+    <a:masterClrMapping/>
+  </p:clrMapOvr>
+</p:sld>
+</file>
+
+<file path=ppt/slides/slide13.xml><?xml version="1.0" encoding="utf-8"?>
+<p:sld xmlns:a="http://schemas.openxmlformats.org/drawingml/2006/main" xmlns:r="http://schemas.openxmlformats.org/officeDocument/2006/relationships" xmlns:p="http://schemas.openxmlformats.org/presentationml/2006/main">
+  <p:cSld>
+    <p:spTree>
+      <p:nvGrpSpPr>
+        <p:cNvPr id="1" name=""/>
+        <p:cNvGrpSpPr/>
+        <p:nvPr/>
+      </p:nvGrpSpPr>
+      <p:grpSpPr>
+        <a:xfrm>
+          <a:off x="0" y="0"/>
+          <a:ext cx="0" cy="0"/>
+          <a:chOff x="0" y="0"/>
+          <a:chExt cx="0" cy="0"/>
+        </a:xfrm>
+      </p:grpSpPr>
+      <p:sp>
+        <p:nvSpPr>
+          <p:cNvPr id="2" name="タイトル 1">
+            <a:extLst>
+              <a:ext uri="{FF2B5EF4-FFF2-40B4-BE49-F238E27FC236}">
+                <a16:creationId xmlns:a16="http://schemas.microsoft.com/office/drawing/2014/main" id="{F865C3BD-EF86-B649-E99B-4BA2FE5082BB}"/>
+              </a:ext>
+            </a:extLst>
+          </p:cNvPr>
+          <p:cNvSpPr>
+            <a:spLocks noGrp="1"/>
+          </p:cNvSpPr>
+          <p:nvPr>
+            <p:ph type="title"/>
+          </p:nvPr>
+        </p:nvSpPr>
+        <p:spPr/>
+        <p:txBody>
+          <a:bodyPr/>
+          <a:lstStyle/>
+          <a:p>
+            <a:r>
+              <a:rPr kumimoji="1" lang="ja-JP" altLang="en-US" dirty="0"/>
+              <a:t>受信</a:t>
+            </a:r>
+            <a:r>
+              <a:rPr kumimoji="1" lang="en-US" altLang="ja-JP" dirty="0"/>
+              <a:t>MIDI </a:t>
+            </a:r>
+            <a:r>
+              <a:rPr kumimoji="1" lang="en-US" altLang="ja-JP" dirty="0" err="1"/>
+              <a:t>ch</a:t>
+            </a:r>
+            <a:r>
+              <a:rPr kumimoji="1" lang="ja-JP" altLang="en-US" dirty="0"/>
+              <a:t>設定</a:t>
+            </a:r>
+          </a:p>
+        </p:txBody>
+      </p:sp>
+      <p:sp>
+        <p:nvSpPr>
+          <p:cNvPr id="3" name="コンテンツ プレースホルダー 2">
+            <a:extLst>
+              <a:ext uri="{FF2B5EF4-FFF2-40B4-BE49-F238E27FC236}">
+                <a16:creationId xmlns:a16="http://schemas.microsoft.com/office/drawing/2014/main" id="{E5D611CC-C6A8-398E-A6AF-6754A2491D98}"/>
+              </a:ext>
+            </a:extLst>
+          </p:cNvPr>
+          <p:cNvSpPr>
+            <a:spLocks noGrp="1"/>
+          </p:cNvSpPr>
+          <p:nvPr>
+            <p:ph idx="1"/>
+          </p:nvPr>
+        </p:nvSpPr>
+        <p:spPr/>
+        <p:txBody>
+          <a:bodyPr/>
+          <a:lstStyle/>
+          <a:p>
+            <a:r>
+              <a:rPr kumimoji="1" lang="ja-JP" altLang="en-US" dirty="0"/>
+              <a:t>複数音源を追加すると、デフォルトでは</a:t>
+            </a:r>
+            <a:r>
+              <a:rPr lang="ja-JP" altLang="en-US" dirty="0"/>
+              <a:t>各音源と</a:t>
+            </a:r>
+            <a:r>
+              <a:rPr kumimoji="1" lang="ja-JP" altLang="en-US" dirty="0"/>
+              <a:t>も同じ</a:t>
+            </a:r>
+            <a:r>
+              <a:rPr kumimoji="1" lang="en-US" altLang="ja-JP" dirty="0"/>
+              <a:t>MIDI </a:t>
+            </a:r>
+            <a:r>
+              <a:rPr kumimoji="1" lang="en-US" altLang="ja-JP" dirty="0" err="1"/>
+              <a:t>ch</a:t>
+            </a:r>
+            <a:r>
+              <a:rPr kumimoji="1" lang="ja-JP" altLang="en-US" dirty="0"/>
+              <a:t>を受信してしまいます。</a:t>
+            </a:r>
+            <a:endParaRPr kumimoji="1" lang="en-US" altLang="ja-JP" dirty="0"/>
+          </a:p>
+          <a:p>
+            <a:r>
+              <a:rPr kumimoji="1" lang="ja-JP" altLang="en-US" dirty="0"/>
+              <a:t>それぞれで受信する</a:t>
+            </a:r>
+            <a:r>
+              <a:rPr lang="en-US" altLang="ja-JP" dirty="0"/>
+              <a:t>MIDI </a:t>
+            </a:r>
+            <a:r>
+              <a:rPr lang="en-US" altLang="ja-JP" dirty="0" err="1"/>
+              <a:t>ch</a:t>
+            </a:r>
+            <a:r>
+              <a:rPr lang="ja-JP" altLang="en-US" dirty="0"/>
+              <a:t>を設定する場合は以下の</a:t>
+            </a:r>
+            <a:r>
+              <a:rPr lang="en-US" altLang="ja-JP" dirty="0"/>
+              <a:t>[Channels]</a:t>
+            </a:r>
+            <a:r>
+              <a:rPr lang="ja-JP" altLang="en-US" dirty="0"/>
+              <a:t>で設定します</a:t>
+            </a:r>
+            <a:endParaRPr kumimoji="1" lang="ja-JP" altLang="en-US" dirty="0"/>
+          </a:p>
+        </p:txBody>
+      </p:sp>
+      <p:sp>
+        <p:nvSpPr>
+          <p:cNvPr id="4" name="スライド番号プレースホルダー 3">
+            <a:extLst>
+              <a:ext uri="{FF2B5EF4-FFF2-40B4-BE49-F238E27FC236}">
+                <a16:creationId xmlns:a16="http://schemas.microsoft.com/office/drawing/2014/main" id="{DE0557E0-CE7A-39C9-66C4-23CAC19221CE}"/>
+              </a:ext>
+            </a:extLst>
+          </p:cNvPr>
+          <p:cNvSpPr>
+            <a:spLocks noGrp="1"/>
+          </p:cNvSpPr>
+          <p:nvPr>
+            <p:ph type="sldNum" sz="quarter" idx="12"/>
+          </p:nvPr>
+        </p:nvSpPr>
+        <p:spPr/>
+        <p:txBody>
+          <a:bodyPr/>
+          <a:lstStyle/>
+          <a:p>
+            <a:fld id="{E27E2812-4560-4165-A7C7-9C013F955547}" type="slidenum">
+              <a:rPr kumimoji="1" lang="ja-JP" altLang="en-US" smtClean="0"/>
+              <a:t>13</a:t>
+            </a:fld>
+            <a:endParaRPr kumimoji="1" lang="ja-JP" altLang="en-US"/>
+          </a:p>
+        </p:txBody>
+      </p:sp>
+      <p:pic>
+        <p:nvPicPr>
+          <p:cNvPr id="6" name="図 5">
+            <a:extLst>
+              <a:ext uri="{FF2B5EF4-FFF2-40B4-BE49-F238E27FC236}">
+                <a16:creationId xmlns:a16="http://schemas.microsoft.com/office/drawing/2014/main" id="{7CBCE10E-7CB5-1982-F5BD-7646B0B47144}"/>
+              </a:ext>
+            </a:extLst>
+          </p:cNvPr>
+          <p:cNvPicPr>
+            <a:picLocks noChangeAspect="1"/>
+          </p:cNvPicPr>
+          <p:nvPr/>
+        </p:nvPicPr>
+        <p:blipFill>
+          <a:blip r:embed="rId2"/>
+          <a:stretch>
+            <a:fillRect/>
+          </a:stretch>
+        </p:blipFill>
+        <p:spPr>
+          <a:xfrm>
+            <a:off x="3006062" y="3464793"/>
+            <a:ext cx="4228626" cy="3114326"/>
+          </a:xfrm>
+          <a:prstGeom prst="rect">
+            <a:avLst/>
+          </a:prstGeom>
+        </p:spPr>
+      </p:pic>
+      <p:sp>
+        <p:nvSpPr>
+          <p:cNvPr id="7" name="四角形: 角を丸くする 6">
+            <a:extLst>
+              <a:ext uri="{FF2B5EF4-FFF2-40B4-BE49-F238E27FC236}">
+                <a16:creationId xmlns:a16="http://schemas.microsoft.com/office/drawing/2014/main" id="{77F2CDA3-1AE2-4452-6A90-B9E9FCBE973F}"/>
+              </a:ext>
+            </a:extLst>
+          </p:cNvPr>
+          <p:cNvSpPr/>
+          <p:nvPr/>
+        </p:nvSpPr>
+        <p:spPr>
+          <a:xfrm>
+            <a:off x="4426103" y="3892257"/>
+            <a:ext cx="2319754" cy="2623562"/>
+          </a:xfrm>
+          <a:prstGeom prst="roundRect">
+            <a:avLst/>
+          </a:prstGeom>
+          <a:noFill/>
+          <a:ln w="76200" cap="flat" cmpd="sng" algn="ctr">
+            <a:solidFill>
+              <a:schemeClr val="accent1"/>
+            </a:solidFill>
+            <a:prstDash val="solid"/>
+            <a:round/>
+            <a:headEnd type="none" w="med" len="med"/>
+            <a:tailEnd type="none" w="med" len="med"/>
+          </a:ln>
+        </p:spPr>
+        <p:style>
+          <a:lnRef idx="0">
+            <a:scrgbClr r="0" g="0" b="0"/>
+          </a:lnRef>
+          <a:fillRef idx="0">
+            <a:scrgbClr r="0" g="0" b="0"/>
+          </a:fillRef>
+          <a:effectRef idx="0">
+            <a:scrgbClr r="0" g="0" b="0"/>
+          </a:effectRef>
+          <a:fontRef idx="minor">
+            <a:schemeClr val="accent1"/>
+          </a:fontRef>
+        </p:style>
+        <p:txBody>
+          <a:bodyPr rtlCol="0" anchor="ctr"/>
+          <a:lstStyle/>
+          <a:p>
+            <a:pPr algn="ctr"/>
+            <a:endParaRPr kumimoji="1" lang="ja-JP" altLang="en-US"/>
+          </a:p>
+        </p:txBody>
+      </p:sp>
+    </p:spTree>
+    <p:extLst>
+      <p:ext uri="{BB962C8B-B14F-4D97-AF65-F5344CB8AC3E}">
+        <p14:creationId xmlns:p14="http://schemas.microsoft.com/office/powerpoint/2010/main" val="2422487152"/>
+      </p:ext>
+    </p:extLst>
+  </p:cSld>
+  <p:clrMapOvr>
+    <a:masterClrMapping/>
+  </p:clrMapOvr>
+</p:sld>
+</file>
+
+<file path=ppt/slides/slide14.xml><?xml version="1.0" encoding="utf-8"?>
+<p:sld xmlns:a="http://schemas.openxmlformats.org/drawingml/2006/main" xmlns:r="http://schemas.openxmlformats.org/officeDocument/2006/relationships" xmlns:p="http://schemas.openxmlformats.org/presentationml/2006/main">
+  <p:cSld>
+    <p:spTree>
+      <p:nvGrpSpPr>
+        <p:cNvPr id="1" name=""/>
+        <p:cNvGrpSpPr/>
+        <p:nvPr/>
+      </p:nvGrpSpPr>
+      <p:grpSpPr>
+        <a:xfrm>
+          <a:off x="0" y="0"/>
+          <a:ext cx="0" cy="0"/>
+          <a:chOff x="0" y="0"/>
+          <a:chExt cx="0" cy="0"/>
+        </a:xfrm>
+      </p:grpSpPr>
+      <p:sp>
+        <p:nvSpPr>
+          <p:cNvPr id="2" name="タイトル 1">
+            <a:extLst>
+              <a:ext uri="{FF2B5EF4-FFF2-40B4-BE49-F238E27FC236}">
+                <a16:creationId xmlns:a16="http://schemas.microsoft.com/office/drawing/2014/main" id="{F865C3BD-EF86-B649-E99B-4BA2FE5082BB}"/>
+              </a:ext>
+            </a:extLst>
+          </p:cNvPr>
+          <p:cNvSpPr>
+            <a:spLocks noGrp="1"/>
+          </p:cNvSpPr>
+          <p:nvPr>
+            <p:ph type="title"/>
+          </p:nvPr>
+        </p:nvSpPr>
+        <p:spPr/>
+        <p:txBody>
+          <a:bodyPr/>
+          <a:lstStyle/>
+          <a:p>
+            <a:r>
+              <a:rPr kumimoji="1" lang="ja-JP" altLang="en-US" dirty="0"/>
+              <a:t>設定を</a:t>
+            </a:r>
+            <a:r>
+              <a:rPr lang="ja-JP" altLang="en-US" dirty="0"/>
+              <a:t>別の場所にエクスポートする</a:t>
+            </a:r>
+            <a:endParaRPr kumimoji="1" lang="ja-JP" altLang="en-US" dirty="0"/>
+          </a:p>
+        </p:txBody>
+      </p:sp>
+      <p:sp>
+        <p:nvSpPr>
+          <p:cNvPr id="3" name="コンテンツ プレースホルダー 2">
+            <a:extLst>
+              <a:ext uri="{FF2B5EF4-FFF2-40B4-BE49-F238E27FC236}">
+                <a16:creationId xmlns:a16="http://schemas.microsoft.com/office/drawing/2014/main" id="{E5D611CC-C6A8-398E-A6AF-6754A2491D98}"/>
+              </a:ext>
+            </a:extLst>
+          </p:cNvPr>
+          <p:cNvSpPr>
+            <a:spLocks noGrp="1"/>
+          </p:cNvSpPr>
+          <p:nvPr>
+            <p:ph idx="1"/>
+          </p:nvPr>
+        </p:nvSpPr>
+        <p:spPr/>
+        <p:txBody>
+          <a:bodyPr/>
+          <a:lstStyle/>
+          <a:p>
+            <a:pPr marL="0" indent="0">
+              <a:buNone/>
+            </a:pPr>
+            <a:r>
+              <a:rPr kumimoji="1" lang="en-US" altLang="ja-JP" dirty="0"/>
+              <a:t>[Mami</a:t>
+            </a:r>
+            <a:r>
+              <a:rPr kumimoji="1" lang="ja-JP" altLang="en-US" dirty="0"/>
+              <a:t>ファイルをエクスポート</a:t>
+            </a:r>
+            <a:r>
+              <a:rPr kumimoji="1" lang="en-US" altLang="ja-JP" dirty="0"/>
+              <a:t>]</a:t>
+            </a:r>
+            <a:r>
+              <a:rPr kumimoji="1" lang="ja-JP" altLang="en-US" dirty="0"/>
+              <a:t>を選んでください。</a:t>
+            </a:r>
+            <a:endParaRPr kumimoji="1" lang="en-US" altLang="ja-JP" dirty="0"/>
+          </a:p>
+          <a:p>
+            <a:pPr marL="0" indent="0">
+              <a:buNone/>
+            </a:pPr>
+            <a:endParaRPr lang="en-US" altLang="ja-JP" dirty="0"/>
+          </a:p>
+          <a:p>
+            <a:pPr marL="0" indent="0">
+              <a:buNone/>
+            </a:pPr>
+            <a:endParaRPr kumimoji="1" lang="en-US" altLang="ja-JP" dirty="0"/>
+          </a:p>
+          <a:p>
+            <a:pPr marL="0" indent="0">
+              <a:buNone/>
+            </a:pPr>
+            <a:endParaRPr lang="en-US" altLang="ja-JP" dirty="0"/>
+          </a:p>
+          <a:p>
+            <a:pPr marL="0" indent="0">
+              <a:buNone/>
+            </a:pPr>
+            <a:endParaRPr kumimoji="1" lang="en-US" altLang="ja-JP" dirty="0"/>
+          </a:p>
+          <a:p>
+            <a:pPr marL="0" indent="0">
+              <a:buNone/>
+            </a:pPr>
+            <a:r>
+              <a:rPr lang="en-US" altLang="ja-JP" dirty="0"/>
+              <a:t>*.Mami</a:t>
+            </a:r>
+            <a:r>
+              <a:rPr lang="ja-JP" altLang="en-US" dirty="0"/>
+              <a:t>ファイルを読み込む場合は、、ここにドロップします</a:t>
+            </a:r>
+            <a:endParaRPr kumimoji="1" lang="ja-JP" altLang="en-US" dirty="0"/>
+          </a:p>
+        </p:txBody>
+      </p:sp>
+      <p:sp>
+        <p:nvSpPr>
+          <p:cNvPr id="4" name="スライド番号プレースホルダー 3">
+            <a:extLst>
+              <a:ext uri="{FF2B5EF4-FFF2-40B4-BE49-F238E27FC236}">
+                <a16:creationId xmlns:a16="http://schemas.microsoft.com/office/drawing/2014/main" id="{DE0557E0-CE7A-39C9-66C4-23CAC19221CE}"/>
+              </a:ext>
+            </a:extLst>
+          </p:cNvPr>
+          <p:cNvSpPr>
+            <a:spLocks noGrp="1"/>
+          </p:cNvSpPr>
+          <p:nvPr>
+            <p:ph type="sldNum" sz="quarter" idx="12"/>
+          </p:nvPr>
+        </p:nvSpPr>
+        <p:spPr/>
+        <p:txBody>
+          <a:bodyPr/>
+          <a:lstStyle/>
+          <a:p>
+            <a:fld id="{E27E2812-4560-4165-A7C7-9C013F955547}" type="slidenum">
+              <a:rPr kumimoji="1" lang="ja-JP" altLang="en-US" smtClean="0"/>
+              <a:t>14</a:t>
+            </a:fld>
+            <a:endParaRPr kumimoji="1" lang="ja-JP" altLang="en-US"/>
+          </a:p>
+        </p:txBody>
+      </p:sp>
+      <p:pic>
+        <p:nvPicPr>
+          <p:cNvPr id="7" name="図 6">
+            <a:extLst>
+              <a:ext uri="{FF2B5EF4-FFF2-40B4-BE49-F238E27FC236}">
+                <a16:creationId xmlns:a16="http://schemas.microsoft.com/office/drawing/2014/main" id="{B1E8C628-0953-377B-80CD-03E69D31F2AE}"/>
+              </a:ext>
+            </a:extLst>
+          </p:cNvPr>
+          <p:cNvPicPr>
+            <a:picLocks noChangeAspect="1"/>
+          </p:cNvPicPr>
+          <p:nvPr/>
+        </p:nvPicPr>
+        <p:blipFill>
+          <a:blip r:embed="rId3"/>
+          <a:stretch>
+            <a:fillRect/>
+          </a:stretch>
+        </p:blipFill>
+        <p:spPr>
+          <a:xfrm>
+            <a:off x="2970952" y="2596859"/>
+            <a:ext cx="2972058" cy="1181202"/>
+          </a:xfrm>
+          <a:prstGeom prst="rect">
+            <a:avLst/>
+          </a:prstGeom>
+        </p:spPr>
+      </p:pic>
+      <p:sp>
+        <p:nvSpPr>
+          <p:cNvPr id="8" name="四角形: 角を丸くする 7">
+            <a:extLst>
+              <a:ext uri="{FF2B5EF4-FFF2-40B4-BE49-F238E27FC236}">
+                <a16:creationId xmlns:a16="http://schemas.microsoft.com/office/drawing/2014/main" id="{0A262E4F-82D0-BD10-3B0E-D6E13F0396B9}"/>
+              </a:ext>
+            </a:extLst>
+          </p:cNvPr>
+          <p:cNvSpPr/>
+          <p:nvPr/>
+        </p:nvSpPr>
+        <p:spPr>
+          <a:xfrm>
+            <a:off x="3080381" y="3498920"/>
+            <a:ext cx="3676977" cy="419819"/>
+          </a:xfrm>
+          <a:prstGeom prst="roundRect">
+            <a:avLst/>
+          </a:prstGeom>
+          <a:noFill/>
+          <a:ln w="76200" cap="flat" cmpd="sng" algn="ctr">
+            <a:solidFill>
+              <a:schemeClr val="accent1"/>
+            </a:solidFill>
+            <a:prstDash val="solid"/>
+            <a:round/>
+            <a:headEnd type="none" w="med" len="med"/>
+            <a:tailEnd type="none" w="med" len="med"/>
+          </a:ln>
+        </p:spPr>
+        <p:style>
+          <a:lnRef idx="0">
+            <a:scrgbClr r="0" g="0" b="0"/>
+          </a:lnRef>
+          <a:fillRef idx="0">
+            <a:scrgbClr r="0" g="0" b="0"/>
+          </a:fillRef>
+          <a:effectRef idx="0">
+            <a:scrgbClr r="0" g="0" b="0"/>
+          </a:effectRef>
+          <a:fontRef idx="minor">
+            <a:schemeClr val="accent1"/>
+          </a:fontRef>
+        </p:style>
+        <p:txBody>
+          <a:bodyPr rtlCol="0" anchor="ctr"/>
+          <a:lstStyle/>
+          <a:p>
+            <a:pPr algn="ctr"/>
+            <a:endParaRPr kumimoji="1" lang="ja-JP" altLang="en-US"/>
+          </a:p>
+        </p:txBody>
+      </p:sp>
+      <p:pic>
+        <p:nvPicPr>
+          <p:cNvPr id="6" name="図 5">
+            <a:extLst>
+              <a:ext uri="{FF2B5EF4-FFF2-40B4-BE49-F238E27FC236}">
+                <a16:creationId xmlns:a16="http://schemas.microsoft.com/office/drawing/2014/main" id="{46C3DCC6-5AAF-EDB5-B8A8-5CFD29DBD034}"/>
+              </a:ext>
+            </a:extLst>
+          </p:cNvPr>
+          <p:cNvPicPr>
+            <a:picLocks noChangeAspect="1"/>
+          </p:cNvPicPr>
+          <p:nvPr/>
+        </p:nvPicPr>
+        <p:blipFill>
+          <a:blip r:embed="rId4"/>
+          <a:stretch>
+            <a:fillRect/>
+          </a:stretch>
+        </p:blipFill>
+        <p:spPr>
+          <a:xfrm>
+            <a:off x="3313882" y="4491897"/>
+            <a:ext cx="2286198" cy="2141406"/>
+          </a:xfrm>
+          <a:prstGeom prst="rect">
+            <a:avLst/>
+          </a:prstGeom>
+        </p:spPr>
+      </p:pic>
+    </p:spTree>
+    <p:extLst>
+      <p:ext uri="{BB962C8B-B14F-4D97-AF65-F5344CB8AC3E}">
+        <p14:creationId xmlns:p14="http://schemas.microsoft.com/office/powerpoint/2010/main" val="43114691"/>
+      </p:ext>
+    </p:extLst>
+  </p:cSld>
+  <p:clrMapOvr>
+    <a:masterClrMapping/>
+  </p:clrMapOvr>
+</p:sld>
+</file>
+
+<file path=ppt/slides/slide15.xml><?xml version="1.0" encoding="utf-8"?>
+<p:sld xmlns:a="http://schemas.openxmlformats.org/drawingml/2006/main" xmlns:r="http://schemas.openxmlformats.org/officeDocument/2006/relationships" xmlns:p="http://schemas.openxmlformats.org/presentationml/2006/main">
+  <p:cSld>
+    <p:spTree>
+      <p:nvGrpSpPr>
+        <p:cNvPr id="1" name=""/>
+        <p:cNvGrpSpPr/>
+        <p:nvPr/>
+      </p:nvGrpSpPr>
+      <p:grpSpPr>
+        <a:xfrm>
+          <a:off x="0" y="0"/>
+          <a:ext cx="0" cy="0"/>
+          <a:chOff x="0" y="0"/>
+          <a:chExt cx="0" cy="0"/>
+        </a:xfrm>
+      </p:grpSpPr>
+      <p:sp>
+        <p:nvSpPr>
+          <p:cNvPr id="2" name="タイトル 1">
+            <a:extLst>
+              <a:ext uri="{FF2B5EF4-FFF2-40B4-BE49-F238E27FC236}">
+                <a16:creationId xmlns:a16="http://schemas.microsoft.com/office/drawing/2014/main" id="{4C1A3DC7-ECC4-FF84-B971-9DF2A72B462C}"/>
+              </a:ext>
+            </a:extLst>
+          </p:cNvPr>
+          <p:cNvSpPr>
+            <a:spLocks noGrp="1"/>
+          </p:cNvSpPr>
+          <p:nvPr>
+            <p:ph type="title"/>
+          </p:nvPr>
+        </p:nvSpPr>
+        <p:spPr/>
+        <p:txBody>
+          <a:bodyPr/>
+          <a:lstStyle/>
+          <a:p>
+            <a:endParaRPr kumimoji="1" lang="ja-JP" altLang="en-US" dirty="0"/>
+          </a:p>
+        </p:txBody>
+      </p:sp>
+      <p:sp>
+        <p:nvSpPr>
+          <p:cNvPr id="3" name="コンテンツ プレースホルダー 2">
+            <a:extLst>
+              <a:ext uri="{FF2B5EF4-FFF2-40B4-BE49-F238E27FC236}">
+                <a16:creationId xmlns:a16="http://schemas.microsoft.com/office/drawing/2014/main" id="{BD7CD47C-A3BF-24B9-9F64-39D20F0D1549}"/>
+              </a:ext>
+            </a:extLst>
+          </p:cNvPr>
+          <p:cNvSpPr>
+            <a:spLocks noGrp="1"/>
+          </p:cNvSpPr>
+          <p:nvPr>
+            <p:ph idx="1"/>
+          </p:nvPr>
+        </p:nvSpPr>
+        <p:spPr/>
+        <p:txBody>
+          <a:bodyPr/>
+          <a:lstStyle/>
+          <a:p>
+            <a:r>
+              <a:rPr kumimoji="1" lang="ja-JP" altLang="en-US" dirty="0"/>
+              <a:t>ザックリとした説明ですが以上です。</a:t>
+            </a:r>
+            <a:r>
+              <a:rPr lang="ja-JP" altLang="en-US" dirty="0"/>
+              <a:t>マニュアルの方にもいくつか情報が記載されていますので参照ください。</a:t>
+            </a:r>
+            <a:br>
+              <a:rPr lang="en-US" altLang="ja-JP" dirty="0"/>
+            </a:br>
+            <a:br>
+              <a:rPr lang="en-US" altLang="ja-JP" dirty="0"/>
+            </a:br>
+            <a:r>
+              <a:rPr lang="en-US" altLang="ja-JP" dirty="0">
+                <a:hlinkClick r:id="rId2"/>
+              </a:rPr>
+              <a:t>https://github.com/110-kenichi/mame/blob/master/docs/MAmidiMEmo/Manual.pdf</a:t>
+            </a:r>
+            <a:br>
+              <a:rPr lang="en-US" altLang="ja-JP" dirty="0"/>
+            </a:br>
+            <a:endParaRPr lang="en-US" altLang="ja-JP" dirty="0"/>
+          </a:p>
+          <a:p>
+            <a:r>
+              <a:rPr kumimoji="1" lang="ja-JP" altLang="en-US" dirty="0"/>
+              <a:t>なにかあれば、お手数ですが</a:t>
+            </a:r>
+            <a:r>
+              <a:rPr kumimoji="1" lang="en-US" altLang="ja-JP" dirty="0"/>
+              <a:t>DM</a:t>
+            </a:r>
+            <a:r>
+              <a:rPr kumimoji="1" lang="ja-JP" altLang="en-US" dirty="0"/>
+              <a:t>などください</a:t>
+            </a:r>
+            <a:endParaRPr kumimoji="1" lang="en-US" altLang="ja-JP" dirty="0"/>
+          </a:p>
+          <a:p>
+            <a:endParaRPr kumimoji="1" lang="ja-JP" altLang="en-US" dirty="0"/>
+          </a:p>
+        </p:txBody>
+      </p:sp>
+      <p:sp>
+        <p:nvSpPr>
+          <p:cNvPr id="4" name="スライド番号プレースホルダー 3">
+            <a:extLst>
+              <a:ext uri="{FF2B5EF4-FFF2-40B4-BE49-F238E27FC236}">
+                <a16:creationId xmlns:a16="http://schemas.microsoft.com/office/drawing/2014/main" id="{4EC99D5F-8BB3-1DC2-F9C5-EDFF3CCD7543}"/>
+              </a:ext>
+            </a:extLst>
+          </p:cNvPr>
+          <p:cNvSpPr>
+            <a:spLocks noGrp="1"/>
+          </p:cNvSpPr>
+          <p:nvPr>
+            <p:ph type="sldNum" sz="quarter" idx="12"/>
+          </p:nvPr>
+        </p:nvSpPr>
+        <p:spPr/>
+        <p:txBody>
+          <a:bodyPr/>
+          <a:lstStyle/>
+          <a:p>
+            <a:fld id="{E27E2812-4560-4165-A7C7-9C013F955547}" type="slidenum">
+              <a:rPr kumimoji="1" lang="ja-JP" altLang="en-US" smtClean="0"/>
+              <a:t>15</a:t>
+            </a:fld>
+            <a:endParaRPr kumimoji="1" lang="ja-JP" altLang="en-US"/>
+          </a:p>
+        </p:txBody>
+      </p:sp>
+    </p:spTree>
+    <p:extLst>
+      <p:ext uri="{BB962C8B-B14F-4D97-AF65-F5344CB8AC3E}">
+        <p14:creationId xmlns:p14="http://schemas.microsoft.com/office/powerpoint/2010/main" val="3794187595"/>
+      </p:ext>
+    </p:extLst>
+  </p:cSld>
+  <p:clrMapOvr>
+    <a:masterClrMapping/>
+  </p:clrMapOvr>
+</p:sld>
+</file>
+
+<file path=ppt/slides/slide2.xml><?xml version="1.0" encoding="utf-8"?>
+<p:sld xmlns:a="http://schemas.openxmlformats.org/drawingml/2006/main" xmlns:r="http://schemas.openxmlformats.org/officeDocument/2006/relationships" xmlns:p="http://schemas.openxmlformats.org/presentationml/2006/main">
+  <p:cSld>
+    <p:spTree>
+      <p:nvGrpSpPr>
+        <p:cNvPr id="1" name=""/>
+        <p:cNvGrpSpPr/>
+        <p:nvPr/>
+      </p:nvGrpSpPr>
+      <p:grpSpPr>
+        <a:xfrm>
+          <a:off x="0" y="0"/>
+          <a:ext cx="0" cy="0"/>
+          <a:chOff x="0" y="0"/>
+          <a:chExt cx="0" cy="0"/>
+        </a:xfrm>
+      </p:grpSpPr>
+      <p:sp>
+        <p:nvSpPr>
+          <p:cNvPr id="2" name="タイトル 1">
+            <a:extLst>
+              <a:ext uri="{FF2B5EF4-FFF2-40B4-BE49-F238E27FC236}">
+                <a16:creationId xmlns:a16="http://schemas.microsoft.com/office/drawing/2014/main" id="{F865C3BD-EF86-B649-E99B-4BA2FE5082BB}"/>
+              </a:ext>
+            </a:extLst>
+          </p:cNvPr>
+          <p:cNvSpPr>
+            <a:spLocks noGrp="1"/>
+          </p:cNvSpPr>
+          <p:nvPr>
+            <p:ph type="title"/>
+          </p:nvPr>
+        </p:nvSpPr>
+        <p:spPr/>
+        <p:txBody>
+          <a:bodyPr/>
+          <a:lstStyle/>
+          <a:p>
+            <a:r>
+              <a:rPr kumimoji="1" lang="en-US" altLang="ja-JP" dirty="0"/>
+              <a:t>SPFM</a:t>
+            </a:r>
+            <a:r>
+              <a:rPr kumimoji="1" lang="ja-JP" altLang="en-US" dirty="0"/>
+              <a:t>をセットアップする</a:t>
+            </a:r>
+          </a:p>
+        </p:txBody>
+      </p:sp>
+      <p:sp>
+        <p:nvSpPr>
+          <p:cNvPr id="4" name="スライド番号プレースホルダー 3">
+            <a:extLst>
+              <a:ext uri="{FF2B5EF4-FFF2-40B4-BE49-F238E27FC236}">
+                <a16:creationId xmlns:a16="http://schemas.microsoft.com/office/drawing/2014/main" id="{DE0557E0-CE7A-39C9-66C4-23CAC19221CE}"/>
+              </a:ext>
+            </a:extLst>
+          </p:cNvPr>
+          <p:cNvSpPr>
+            <a:spLocks noGrp="1"/>
+          </p:cNvSpPr>
+          <p:nvPr>
+            <p:ph type="sldNum" sz="quarter" idx="12"/>
+          </p:nvPr>
+        </p:nvSpPr>
+        <p:spPr/>
+        <p:txBody>
+          <a:bodyPr/>
+          <a:lstStyle/>
+          <a:p>
+            <a:fld id="{E27E2812-4560-4165-A7C7-9C013F955547}" type="slidenum">
+              <a:rPr kumimoji="1" lang="ja-JP" altLang="en-US" smtClean="0"/>
+              <a:t>2</a:t>
             </a:fld>
             <a:endParaRPr kumimoji="1" lang="ja-JP" altLang="en-US"/>
           </a:p>
@@ -9449,7 +11616,7 @@
 </p:sld>
 </file>
 
-<file path=ppt/slides/slide10.xml><?xml version="1.0" encoding="utf-8"?>
+<file path=ppt/slides/slide3.xml><?xml version="1.0" encoding="utf-8"?>
 <p:sld xmlns:a="http://schemas.openxmlformats.org/drawingml/2006/main" xmlns:r="http://schemas.openxmlformats.org/officeDocument/2006/relationships" xmlns:p="http://schemas.openxmlformats.org/presentationml/2006/main">
   <p:cSld>
     <p:spTree>
@@ -9484,51 +11651,25 @@
         </p:nvSpPr>
         <p:spPr/>
         <p:txBody>
-          <a:bodyPr>
-            <a:normAutofit fontScale="90000"/>
-          </a:bodyPr>
+          <a:bodyPr/>
           <a:lstStyle/>
           <a:p>
             <a:r>
-              <a:rPr kumimoji="1" lang="ja-JP" altLang="en-US" b="1" dirty="0"/>
-              <a:t>音色設定</a:t>
-            </a:r>
-            <a:r>
-              <a:rPr kumimoji="1" lang="en-US" altLang="ja-JP" b="1" dirty="0"/>
-              <a:t>5(</a:t>
-            </a:r>
-            <a:r>
-              <a:rPr kumimoji="1" lang="ja-JP" altLang="en-US" b="1" dirty="0"/>
-              <a:t>エキスパート向け</a:t>
-            </a:r>
-            <a:r>
-              <a:rPr kumimoji="1" lang="en-US" altLang="ja-JP" b="1" dirty="0"/>
-              <a:t>)</a:t>
-            </a:r>
-            <a:br>
-              <a:rPr kumimoji="1" lang="en-US" altLang="ja-JP" b="1" dirty="0"/>
-            </a:br>
+              <a:rPr kumimoji="1" lang="en-US" altLang="ja-JP" dirty="0" err="1"/>
+              <a:t>MAmidiMEmo</a:t>
+            </a:r>
             <a:r>
               <a:rPr kumimoji="1" lang="ja-JP" altLang="en-US" dirty="0"/>
-              <a:t>ドラム</a:t>
-            </a:r>
-            <a:r>
-              <a:rPr kumimoji="1" lang="en-US" altLang="ja-JP" dirty="0" err="1"/>
-              <a:t>ch</a:t>
+              <a:t>の</a:t>
             </a:r>
             <a:r>
               <a:rPr kumimoji="1" lang="en-US" altLang="ja-JP" dirty="0"/>
-              <a:t>(10ch)</a:t>
+              <a:t>VST2</a:t>
             </a:r>
             <a:r>
               <a:rPr kumimoji="1" lang="ja-JP" altLang="en-US" dirty="0"/>
-              <a:t>用の音色や、複数音を合成させた</a:t>
-            </a:r>
-            <a:r>
-              <a:rPr lang="ja-JP" altLang="en-US" dirty="0"/>
-              <a:t>音色も設定できます</a:t>
-            </a:r>
-            <a:endParaRPr kumimoji="1" lang="ja-JP" altLang="en-US" dirty="0"/>
+              <a:t>音源としてインストールする</a:t>
+            </a:r>
           </a:p>
         </p:txBody>
       </p:sp>
@@ -9555,1450 +11696,7 @@
           <a:p>
             <a:fld id="{E27E2812-4560-4165-A7C7-9C013F955547}" type="slidenum">
               <a:rPr kumimoji="1" lang="ja-JP" altLang="en-US" smtClean="0"/>
-              <a:t>10</a:t>
-            </a:fld>
-            <a:endParaRPr kumimoji="1" lang="ja-JP" altLang="en-US"/>
-          </a:p>
-        </p:txBody>
-      </p:sp>
-      <p:pic>
-        <p:nvPicPr>
-          <p:cNvPr id="9" name="図 8">
-            <a:extLst>
-              <a:ext uri="{FF2B5EF4-FFF2-40B4-BE49-F238E27FC236}">
-                <a16:creationId xmlns:a16="http://schemas.microsoft.com/office/drawing/2014/main" id="{828EE879-AA65-90CA-E280-EBFB14B970C1}"/>
-              </a:ext>
-            </a:extLst>
-          </p:cNvPr>
-          <p:cNvPicPr>
-            <a:picLocks noChangeAspect="1"/>
-          </p:cNvPicPr>
-          <p:nvPr/>
-        </p:nvPicPr>
-        <p:blipFill>
-          <a:blip r:embed="rId3"/>
-          <a:stretch>
-            <a:fillRect/>
-          </a:stretch>
-        </p:blipFill>
-        <p:spPr>
-          <a:xfrm>
-            <a:off x="1578521" y="2300724"/>
-            <a:ext cx="4999307" cy="2023985"/>
-          </a:xfrm>
-          <a:prstGeom prst="rect">
-            <a:avLst/>
-          </a:prstGeom>
-        </p:spPr>
-      </p:pic>
-      <p:pic>
-        <p:nvPicPr>
-          <p:cNvPr id="13" name="図 12">
-            <a:extLst>
-              <a:ext uri="{FF2B5EF4-FFF2-40B4-BE49-F238E27FC236}">
-                <a16:creationId xmlns:a16="http://schemas.microsoft.com/office/drawing/2014/main" id="{E7FCEE2F-8A35-BD6B-6490-34ECC2F8F9E7}"/>
-              </a:ext>
-            </a:extLst>
-          </p:cNvPr>
-          <p:cNvPicPr>
-            <a:picLocks noChangeAspect="1"/>
-          </p:cNvPicPr>
-          <p:nvPr/>
-        </p:nvPicPr>
-        <p:blipFill>
-          <a:blip r:embed="rId4"/>
-          <a:stretch>
-            <a:fillRect/>
-          </a:stretch>
-        </p:blipFill>
-        <p:spPr>
-          <a:xfrm>
-            <a:off x="4601192" y="4427877"/>
-            <a:ext cx="3658049" cy="2360750"/>
-          </a:xfrm>
-          <a:prstGeom prst="rect">
-            <a:avLst/>
-          </a:prstGeom>
-        </p:spPr>
-      </p:pic>
-      <p:pic>
-        <p:nvPicPr>
-          <p:cNvPr id="15" name="図 14">
-            <a:extLst>
-              <a:ext uri="{FF2B5EF4-FFF2-40B4-BE49-F238E27FC236}">
-                <a16:creationId xmlns:a16="http://schemas.microsoft.com/office/drawing/2014/main" id="{C30D2566-85DA-0938-C302-4EEF4208B611}"/>
-              </a:ext>
-            </a:extLst>
-          </p:cNvPr>
-          <p:cNvPicPr>
-            <a:picLocks noChangeAspect="1"/>
-          </p:cNvPicPr>
-          <p:nvPr/>
-        </p:nvPicPr>
-        <p:blipFill>
-          <a:blip r:embed="rId5"/>
-          <a:stretch>
-            <a:fillRect/>
-          </a:stretch>
-        </p:blipFill>
-        <p:spPr>
-          <a:xfrm>
-            <a:off x="775598" y="4812004"/>
-            <a:ext cx="3376583" cy="613924"/>
-          </a:xfrm>
-          <a:prstGeom prst="rect">
-            <a:avLst/>
-          </a:prstGeom>
-        </p:spPr>
-      </p:pic>
-      <p:sp>
-        <p:nvSpPr>
-          <p:cNvPr id="16" name="四角形: 角を丸くする 15">
-            <a:extLst>
-              <a:ext uri="{FF2B5EF4-FFF2-40B4-BE49-F238E27FC236}">
-                <a16:creationId xmlns:a16="http://schemas.microsoft.com/office/drawing/2014/main" id="{5E052F39-1068-F364-2285-A578AD3716CC}"/>
-              </a:ext>
-            </a:extLst>
-          </p:cNvPr>
-          <p:cNvSpPr/>
-          <p:nvPr/>
-        </p:nvSpPr>
-        <p:spPr>
-          <a:xfrm>
-            <a:off x="2760452" y="3214776"/>
-            <a:ext cx="2978989" cy="299049"/>
-          </a:xfrm>
-          <a:prstGeom prst="roundRect">
-            <a:avLst/>
-          </a:prstGeom>
-          <a:noFill/>
-          <a:ln w="76200" cap="flat" cmpd="sng" algn="ctr">
-            <a:solidFill>
-              <a:schemeClr val="accent1"/>
-            </a:solidFill>
-            <a:prstDash val="solid"/>
-            <a:round/>
-            <a:headEnd type="none" w="med" len="med"/>
-            <a:tailEnd type="none" w="med" len="med"/>
-          </a:ln>
-        </p:spPr>
-        <p:style>
-          <a:lnRef idx="0">
-            <a:scrgbClr r="0" g="0" b="0"/>
-          </a:lnRef>
-          <a:fillRef idx="0">
-            <a:scrgbClr r="0" g="0" b="0"/>
-          </a:fillRef>
-          <a:effectRef idx="0">
-            <a:scrgbClr r="0" g="0" b="0"/>
-          </a:effectRef>
-          <a:fontRef idx="minor">
-            <a:schemeClr val="accent1"/>
-          </a:fontRef>
-        </p:style>
-        <p:txBody>
-          <a:bodyPr rtlCol="0" anchor="ctr"/>
-          <a:lstStyle/>
-          <a:p>
-            <a:pPr algn="ctr"/>
-            <a:endParaRPr kumimoji="1" lang="ja-JP" altLang="en-US"/>
-          </a:p>
-        </p:txBody>
-      </p:sp>
-      <p:sp>
-        <p:nvSpPr>
-          <p:cNvPr id="18" name="吹き出し: 四角形 17">
-            <a:extLst>
-              <a:ext uri="{FF2B5EF4-FFF2-40B4-BE49-F238E27FC236}">
-                <a16:creationId xmlns:a16="http://schemas.microsoft.com/office/drawing/2014/main" id="{340FCEAA-1672-8630-C2A0-1971877156E2}"/>
-              </a:ext>
-            </a:extLst>
-          </p:cNvPr>
-          <p:cNvSpPr/>
-          <p:nvPr/>
-        </p:nvSpPr>
-        <p:spPr>
-          <a:xfrm>
-            <a:off x="7567615" y="2636263"/>
-            <a:ext cx="3605841" cy="984849"/>
-          </a:xfrm>
-          <a:prstGeom prst="wedgeRectCallout">
-            <a:avLst>
-              <a:gd name="adj1" fmla="val -105522"/>
-              <a:gd name="adj2" fmla="val 29070"/>
-            </a:avLst>
-          </a:prstGeom>
-        </p:spPr>
-        <p:style>
-          <a:lnRef idx="1">
-            <a:schemeClr val="accent2"/>
-          </a:lnRef>
-          <a:fillRef idx="2">
-            <a:schemeClr val="accent2"/>
-          </a:fillRef>
-          <a:effectRef idx="1">
-            <a:schemeClr val="accent2"/>
-          </a:effectRef>
-          <a:fontRef idx="minor">
-            <a:schemeClr val="dk1"/>
-          </a:fontRef>
-        </p:style>
-        <p:txBody>
-          <a:bodyPr rtlCol="0" anchor="ctr"/>
-          <a:lstStyle/>
-          <a:p>
-            <a:pPr algn="ctr"/>
-            <a:r>
-              <a:rPr kumimoji="1" lang="en-US" altLang="ja-JP" dirty="0"/>
-              <a:t>MIDI 10ch</a:t>
-            </a:r>
-            <a:r>
-              <a:rPr kumimoji="1" lang="ja-JP" altLang="en-US" dirty="0"/>
-              <a:t>の鍵盤</a:t>
-            </a:r>
-            <a:r>
-              <a:rPr kumimoji="1" lang="en-US" altLang="ja-JP" dirty="0"/>
-              <a:t>C-1</a:t>
-            </a:r>
-            <a:r>
-              <a:rPr kumimoji="1" lang="ja-JP" altLang="en-US" dirty="0"/>
-              <a:t>に、割り当てる音色を記載する</a:t>
-            </a:r>
-          </a:p>
-        </p:txBody>
-      </p:sp>
-      <p:sp>
-        <p:nvSpPr>
-          <p:cNvPr id="19" name="吹き出し: 四角形 18">
-            <a:extLst>
-              <a:ext uri="{FF2B5EF4-FFF2-40B4-BE49-F238E27FC236}">
-                <a16:creationId xmlns:a16="http://schemas.microsoft.com/office/drawing/2014/main" id="{A67F24AD-CD85-E061-B820-E923441A5455}"/>
-              </a:ext>
-            </a:extLst>
-          </p:cNvPr>
-          <p:cNvSpPr/>
-          <p:nvPr/>
-        </p:nvSpPr>
-        <p:spPr>
-          <a:xfrm>
-            <a:off x="6430215" y="3724280"/>
-            <a:ext cx="3605841" cy="984849"/>
-          </a:xfrm>
-          <a:prstGeom prst="wedgeRectCallout">
-            <a:avLst>
-              <a:gd name="adj1" fmla="val -138058"/>
-              <a:gd name="adj2" fmla="val 63522"/>
-            </a:avLst>
-          </a:prstGeom>
-        </p:spPr>
-        <p:style>
-          <a:lnRef idx="1">
-            <a:schemeClr val="accent2"/>
-          </a:lnRef>
-          <a:fillRef idx="2">
-            <a:schemeClr val="accent2"/>
-          </a:fillRef>
-          <a:effectRef idx="1">
-            <a:schemeClr val="accent2"/>
-          </a:effectRef>
-          <a:fontRef idx="minor">
-            <a:schemeClr val="dk1"/>
-          </a:fontRef>
-        </p:style>
-        <p:txBody>
-          <a:bodyPr rtlCol="0" anchor="ctr"/>
-          <a:lstStyle/>
-          <a:p>
-            <a:pPr algn="ctr"/>
-            <a:r>
-              <a:rPr kumimoji="1" lang="en-US" altLang="ja-JP" dirty="0"/>
-              <a:t>[</a:t>
-            </a:r>
-            <a:r>
-              <a:rPr kumimoji="1" lang="en-US" altLang="ja-JP" dirty="0" err="1"/>
-              <a:t>CombinedTimbre</a:t>
-            </a:r>
-            <a:r>
-              <a:rPr kumimoji="1" lang="en-US" altLang="ja-JP" dirty="0"/>
-              <a:t>]</a:t>
-            </a:r>
-            <a:r>
-              <a:rPr kumimoji="1" lang="ja-JP" altLang="en-US" dirty="0"/>
-              <a:t>で複数音色を同時に鳴らせます</a:t>
-            </a:r>
-          </a:p>
-        </p:txBody>
-      </p:sp>
-      <p:sp>
-        <p:nvSpPr>
-          <p:cNvPr id="20" name="四角形: 角を丸くする 19">
-            <a:extLst>
-              <a:ext uri="{FF2B5EF4-FFF2-40B4-BE49-F238E27FC236}">
-                <a16:creationId xmlns:a16="http://schemas.microsoft.com/office/drawing/2014/main" id="{9D2C2094-4745-A1D0-B17B-2A38120D94E4}"/>
-              </a:ext>
-            </a:extLst>
-          </p:cNvPr>
-          <p:cNvSpPr/>
-          <p:nvPr/>
-        </p:nvSpPr>
-        <p:spPr>
-          <a:xfrm>
-            <a:off x="3860395" y="5007090"/>
-            <a:ext cx="583572" cy="299049"/>
-          </a:xfrm>
-          <a:prstGeom prst="roundRect">
-            <a:avLst/>
-          </a:prstGeom>
-          <a:noFill/>
-          <a:ln w="76200" cap="flat" cmpd="sng" algn="ctr">
-            <a:solidFill>
-              <a:schemeClr val="accent1"/>
-            </a:solidFill>
-            <a:prstDash val="solid"/>
-            <a:round/>
-            <a:headEnd type="none" w="med" len="med"/>
-            <a:tailEnd type="none" w="med" len="med"/>
-          </a:ln>
-        </p:spPr>
-        <p:style>
-          <a:lnRef idx="0">
-            <a:scrgbClr r="0" g="0" b="0"/>
-          </a:lnRef>
-          <a:fillRef idx="0">
-            <a:scrgbClr r="0" g="0" b="0"/>
-          </a:fillRef>
-          <a:effectRef idx="0">
-            <a:scrgbClr r="0" g="0" b="0"/>
-          </a:effectRef>
-          <a:fontRef idx="minor">
-            <a:schemeClr val="accent1"/>
-          </a:fontRef>
-        </p:style>
-        <p:txBody>
-          <a:bodyPr rtlCol="0" anchor="ctr"/>
-          <a:lstStyle/>
-          <a:p>
-            <a:pPr algn="ctr"/>
-            <a:endParaRPr kumimoji="1" lang="ja-JP" altLang="en-US"/>
-          </a:p>
-        </p:txBody>
-      </p:sp>
-      <p:sp>
-        <p:nvSpPr>
-          <p:cNvPr id="21" name="四角形: 角を丸くする 20">
-            <a:extLst>
-              <a:ext uri="{FF2B5EF4-FFF2-40B4-BE49-F238E27FC236}">
-                <a16:creationId xmlns:a16="http://schemas.microsoft.com/office/drawing/2014/main" id="{3B5B9FF1-DECE-1BE2-1E44-F5DBF1582434}"/>
-              </a:ext>
-            </a:extLst>
-          </p:cNvPr>
-          <p:cNvSpPr/>
-          <p:nvPr/>
-        </p:nvSpPr>
-        <p:spPr>
-          <a:xfrm>
-            <a:off x="4443967" y="6256532"/>
-            <a:ext cx="1009440" cy="299049"/>
-          </a:xfrm>
-          <a:prstGeom prst="roundRect">
-            <a:avLst/>
-          </a:prstGeom>
-          <a:noFill/>
-          <a:ln w="76200" cap="flat" cmpd="sng" algn="ctr">
-            <a:solidFill>
-              <a:schemeClr val="accent1"/>
-            </a:solidFill>
-            <a:prstDash val="solid"/>
-            <a:round/>
-            <a:headEnd type="none" w="med" len="med"/>
-            <a:tailEnd type="none" w="med" len="med"/>
-          </a:ln>
-        </p:spPr>
-        <p:style>
-          <a:lnRef idx="0">
-            <a:scrgbClr r="0" g="0" b="0"/>
-          </a:lnRef>
-          <a:fillRef idx="0">
-            <a:scrgbClr r="0" g="0" b="0"/>
-          </a:fillRef>
-          <a:effectRef idx="0">
-            <a:scrgbClr r="0" g="0" b="0"/>
-          </a:effectRef>
-          <a:fontRef idx="minor">
-            <a:schemeClr val="accent1"/>
-          </a:fontRef>
-        </p:style>
-        <p:txBody>
-          <a:bodyPr rtlCol="0" anchor="ctr"/>
-          <a:lstStyle/>
-          <a:p>
-            <a:pPr algn="ctr"/>
-            <a:endParaRPr kumimoji="1" lang="ja-JP" altLang="en-US"/>
-          </a:p>
-        </p:txBody>
-      </p:sp>
-      <p:sp>
-        <p:nvSpPr>
-          <p:cNvPr id="22" name="四角形: 角を丸くする 21">
-            <a:extLst>
-              <a:ext uri="{FF2B5EF4-FFF2-40B4-BE49-F238E27FC236}">
-                <a16:creationId xmlns:a16="http://schemas.microsoft.com/office/drawing/2014/main" id="{B97C0151-74EC-C07F-10BC-31E2E6E94B0B}"/>
-              </a:ext>
-            </a:extLst>
-          </p:cNvPr>
-          <p:cNvSpPr/>
-          <p:nvPr/>
-        </p:nvSpPr>
-        <p:spPr>
-          <a:xfrm>
-            <a:off x="6430215" y="6043747"/>
-            <a:ext cx="1392579" cy="299049"/>
-          </a:xfrm>
-          <a:prstGeom prst="roundRect">
-            <a:avLst/>
-          </a:prstGeom>
-          <a:noFill/>
-          <a:ln w="76200" cap="flat" cmpd="sng" algn="ctr">
-            <a:solidFill>
-              <a:schemeClr val="accent1"/>
-            </a:solidFill>
-            <a:prstDash val="solid"/>
-            <a:round/>
-            <a:headEnd type="none" w="med" len="med"/>
-            <a:tailEnd type="none" w="med" len="med"/>
-          </a:ln>
-        </p:spPr>
-        <p:style>
-          <a:lnRef idx="0">
-            <a:scrgbClr r="0" g="0" b="0"/>
-          </a:lnRef>
-          <a:fillRef idx="0">
-            <a:scrgbClr r="0" g="0" b="0"/>
-          </a:fillRef>
-          <a:effectRef idx="0">
-            <a:scrgbClr r="0" g="0" b="0"/>
-          </a:effectRef>
-          <a:fontRef idx="minor">
-            <a:schemeClr val="accent1"/>
-          </a:fontRef>
-        </p:style>
-        <p:txBody>
-          <a:bodyPr rtlCol="0" anchor="ctr"/>
-          <a:lstStyle/>
-          <a:p>
-            <a:pPr algn="ctr"/>
-            <a:endParaRPr kumimoji="1" lang="ja-JP" altLang="en-US"/>
-          </a:p>
-        </p:txBody>
-      </p:sp>
-      <p:pic>
-        <p:nvPicPr>
-          <p:cNvPr id="24" name="図 23">
-            <a:extLst>
-              <a:ext uri="{FF2B5EF4-FFF2-40B4-BE49-F238E27FC236}">
-                <a16:creationId xmlns:a16="http://schemas.microsoft.com/office/drawing/2014/main" id="{C0D24139-D47F-9D38-6422-EF7794975587}"/>
-              </a:ext>
-            </a:extLst>
-          </p:cNvPr>
-          <p:cNvPicPr>
-            <a:picLocks noChangeAspect="1"/>
-          </p:cNvPicPr>
-          <p:nvPr/>
-        </p:nvPicPr>
-        <p:blipFill>
-          <a:blip r:embed="rId6"/>
-          <a:stretch>
-            <a:fillRect/>
-          </a:stretch>
-        </p:blipFill>
-        <p:spPr>
-          <a:xfrm>
-            <a:off x="8486027" y="5455497"/>
-            <a:ext cx="3562199" cy="1396608"/>
-          </a:xfrm>
-          <a:prstGeom prst="rect">
-            <a:avLst/>
-          </a:prstGeom>
-        </p:spPr>
-      </p:pic>
-      <p:sp>
-        <p:nvSpPr>
-          <p:cNvPr id="25" name="矢印: 右 24">
-            <a:extLst>
-              <a:ext uri="{FF2B5EF4-FFF2-40B4-BE49-F238E27FC236}">
-                <a16:creationId xmlns:a16="http://schemas.microsoft.com/office/drawing/2014/main" id="{F823E779-EFA9-D44D-84AE-959BD158EDC0}"/>
-              </a:ext>
-            </a:extLst>
-          </p:cNvPr>
-          <p:cNvSpPr/>
-          <p:nvPr/>
-        </p:nvSpPr>
-        <p:spPr>
-          <a:xfrm>
-            <a:off x="4277189" y="5357762"/>
-            <a:ext cx="333555" cy="495388"/>
-          </a:xfrm>
-          <a:prstGeom prst="rightArrow">
-            <a:avLst/>
-          </a:prstGeom>
-        </p:spPr>
-        <p:style>
-          <a:lnRef idx="2">
-            <a:schemeClr val="accent6">
-              <a:shade val="50000"/>
-            </a:schemeClr>
-          </a:lnRef>
-          <a:fillRef idx="1">
-            <a:schemeClr val="accent6"/>
-          </a:fillRef>
-          <a:effectRef idx="0">
-            <a:schemeClr val="accent6"/>
-          </a:effectRef>
-          <a:fontRef idx="minor">
-            <a:schemeClr val="lt1"/>
-          </a:fontRef>
-        </p:style>
-        <p:txBody>
-          <a:bodyPr rtlCol="0" anchor="ctr"/>
-          <a:lstStyle/>
-          <a:p>
-            <a:pPr algn="ctr"/>
-            <a:endParaRPr kumimoji="1" lang="ja-JP" altLang="en-US"/>
-          </a:p>
-        </p:txBody>
-      </p:sp>
-      <p:sp>
-        <p:nvSpPr>
-          <p:cNvPr id="26" name="吹き出し: 四角形 25">
-            <a:extLst>
-              <a:ext uri="{FF2B5EF4-FFF2-40B4-BE49-F238E27FC236}">
-                <a16:creationId xmlns:a16="http://schemas.microsoft.com/office/drawing/2014/main" id="{21A609EC-B12F-7157-38E7-C9119994B628}"/>
-              </a:ext>
-            </a:extLst>
-          </p:cNvPr>
-          <p:cNvSpPr/>
-          <p:nvPr/>
-        </p:nvSpPr>
-        <p:spPr>
-          <a:xfrm>
-            <a:off x="8367623" y="4646762"/>
-            <a:ext cx="3824377" cy="808734"/>
-          </a:xfrm>
-          <a:prstGeom prst="wedgeRectCallout">
-            <a:avLst>
-              <a:gd name="adj1" fmla="val 2762"/>
-              <a:gd name="adj2" fmla="val 70755"/>
-            </a:avLst>
-          </a:prstGeom>
-        </p:spPr>
-        <p:style>
-          <a:lnRef idx="1">
-            <a:schemeClr val="accent2"/>
-          </a:lnRef>
-          <a:fillRef idx="2">
-            <a:schemeClr val="accent2"/>
-          </a:fillRef>
-          <a:effectRef idx="1">
-            <a:schemeClr val="accent2"/>
-          </a:effectRef>
-          <a:fontRef idx="minor">
-            <a:schemeClr val="dk1"/>
-          </a:fontRef>
-        </p:style>
-        <p:txBody>
-          <a:bodyPr rtlCol="0" anchor="ctr"/>
-          <a:lstStyle/>
-          <a:p>
-            <a:pPr algn="ctr"/>
-            <a:r>
-              <a:rPr kumimoji="1" lang="ja-JP" altLang="en-US" sz="1400" dirty="0"/>
-              <a:t>プログラム番号</a:t>
-            </a:r>
-            <a:r>
-              <a:rPr kumimoji="1" lang="en-US" altLang="ja-JP" sz="1400" dirty="0"/>
-              <a:t>X</a:t>
-            </a:r>
-            <a:r>
-              <a:rPr kumimoji="1" lang="ja-JP" altLang="en-US" sz="1400" dirty="0"/>
-              <a:t>に、</a:t>
-            </a:r>
-            <a:r>
-              <a:rPr kumimoji="1" lang="en-US" altLang="ja-JP" sz="1400" dirty="0" err="1"/>
-              <a:t>TimbreX</a:t>
-            </a:r>
-            <a:r>
-              <a:rPr kumimoji="1" lang="ja-JP" altLang="en-US" sz="1400" dirty="0"/>
-              <a:t>ではなく、</a:t>
-            </a:r>
-            <a:r>
-              <a:rPr kumimoji="1" lang="en-US" altLang="ja-JP" sz="1400" dirty="0" err="1"/>
-              <a:t>CombinedTimbreX</a:t>
-            </a:r>
-            <a:r>
-              <a:rPr kumimoji="1" lang="ja-JP" altLang="en-US" sz="1400" dirty="0"/>
-              <a:t>を割り当てます。</a:t>
-            </a:r>
-            <a:r>
-              <a:rPr kumimoji="1" lang="en-US" altLang="ja-JP" sz="1400" dirty="0"/>
-              <a:t>(</a:t>
-            </a:r>
-            <a:r>
-              <a:rPr kumimoji="1" lang="ja-JP" altLang="en-US" sz="1400" dirty="0"/>
-              <a:t>バンクを切り替えている、とイメージしてください</a:t>
-            </a:r>
-            <a:r>
-              <a:rPr kumimoji="1" lang="en-US" altLang="ja-JP" sz="1400" dirty="0"/>
-              <a:t>)</a:t>
-            </a:r>
-            <a:endParaRPr kumimoji="1" lang="ja-JP" altLang="en-US" sz="1400" dirty="0"/>
-          </a:p>
-        </p:txBody>
-      </p:sp>
-      <p:sp>
-        <p:nvSpPr>
-          <p:cNvPr id="27" name="四角形: 角を丸くする 26">
-            <a:extLst>
-              <a:ext uri="{FF2B5EF4-FFF2-40B4-BE49-F238E27FC236}">
-                <a16:creationId xmlns:a16="http://schemas.microsoft.com/office/drawing/2014/main" id="{42BD069D-26CA-589B-2D68-FF50D43BD249}"/>
-              </a:ext>
-            </a:extLst>
-          </p:cNvPr>
-          <p:cNvSpPr/>
-          <p:nvPr/>
-        </p:nvSpPr>
-        <p:spPr>
-          <a:xfrm>
-            <a:off x="8643668" y="6481146"/>
-            <a:ext cx="2600937" cy="337224"/>
-          </a:xfrm>
-          <a:prstGeom prst="roundRect">
-            <a:avLst/>
-          </a:prstGeom>
-          <a:noFill/>
-          <a:ln w="76200" cap="flat" cmpd="sng" algn="ctr">
-            <a:solidFill>
-              <a:schemeClr val="accent1"/>
-            </a:solidFill>
-            <a:prstDash val="solid"/>
-            <a:round/>
-            <a:headEnd type="none" w="med" len="med"/>
-            <a:tailEnd type="none" w="med" len="med"/>
-          </a:ln>
-        </p:spPr>
-        <p:style>
-          <a:lnRef idx="0">
-            <a:scrgbClr r="0" g="0" b="0"/>
-          </a:lnRef>
-          <a:fillRef idx="0">
-            <a:scrgbClr r="0" g="0" b="0"/>
-          </a:fillRef>
-          <a:effectRef idx="0">
-            <a:scrgbClr r="0" g="0" b="0"/>
-          </a:effectRef>
-          <a:fontRef idx="minor">
-            <a:schemeClr val="accent1"/>
-          </a:fontRef>
-        </p:style>
-        <p:txBody>
-          <a:bodyPr rtlCol="0" anchor="ctr"/>
-          <a:lstStyle/>
-          <a:p>
-            <a:pPr algn="ctr"/>
-            <a:endParaRPr kumimoji="1" lang="ja-JP" altLang="en-US"/>
-          </a:p>
-        </p:txBody>
-      </p:sp>
-    </p:spTree>
-    <p:extLst>
-      <p:ext uri="{BB962C8B-B14F-4D97-AF65-F5344CB8AC3E}">
-        <p14:creationId xmlns:p14="http://schemas.microsoft.com/office/powerpoint/2010/main" val="2360931659"/>
-      </p:ext>
-    </p:extLst>
-  </p:cSld>
-  <p:clrMapOvr>
-    <a:masterClrMapping/>
-  </p:clrMapOvr>
-</p:sld>
-</file>
-
-<file path=ppt/slides/slide11.xml><?xml version="1.0" encoding="utf-8"?>
-<p:sld xmlns:a="http://schemas.openxmlformats.org/drawingml/2006/main" xmlns:r="http://schemas.openxmlformats.org/officeDocument/2006/relationships" xmlns:p="http://schemas.openxmlformats.org/presentationml/2006/main">
-  <p:cSld>
-    <p:spTree>
-      <p:nvGrpSpPr>
-        <p:cNvPr id="1" name=""/>
-        <p:cNvGrpSpPr/>
-        <p:nvPr/>
-      </p:nvGrpSpPr>
-      <p:grpSpPr>
-        <a:xfrm>
-          <a:off x="0" y="0"/>
-          <a:ext cx="0" cy="0"/>
-          <a:chOff x="0" y="0"/>
-          <a:chExt cx="0" cy="0"/>
-        </a:xfrm>
-      </p:grpSpPr>
-      <p:sp>
-        <p:nvSpPr>
-          <p:cNvPr id="2" name="タイトル 1">
-            <a:extLst>
-              <a:ext uri="{FF2B5EF4-FFF2-40B4-BE49-F238E27FC236}">
-                <a16:creationId xmlns:a16="http://schemas.microsoft.com/office/drawing/2014/main" id="{F865C3BD-EF86-B649-E99B-4BA2FE5082BB}"/>
-              </a:ext>
-            </a:extLst>
-          </p:cNvPr>
-          <p:cNvSpPr>
-            <a:spLocks noGrp="1"/>
-          </p:cNvSpPr>
-          <p:nvPr>
-            <p:ph type="title"/>
-          </p:nvPr>
-        </p:nvSpPr>
-        <p:spPr/>
-        <p:txBody>
-          <a:bodyPr/>
-          <a:lstStyle/>
-          <a:p>
-            <a:r>
-              <a:rPr kumimoji="1" lang="ja-JP" altLang="en-US" dirty="0"/>
-              <a:t>受信</a:t>
-            </a:r>
-            <a:r>
-              <a:rPr kumimoji="1" lang="en-US" altLang="ja-JP" dirty="0"/>
-              <a:t>MIDI </a:t>
-            </a:r>
-            <a:r>
-              <a:rPr kumimoji="1" lang="en-US" altLang="ja-JP" dirty="0" err="1"/>
-              <a:t>ch</a:t>
-            </a:r>
-            <a:r>
-              <a:rPr kumimoji="1" lang="ja-JP" altLang="en-US" dirty="0"/>
-              <a:t>設定</a:t>
-            </a:r>
-          </a:p>
-        </p:txBody>
-      </p:sp>
-      <p:sp>
-        <p:nvSpPr>
-          <p:cNvPr id="3" name="コンテンツ プレースホルダー 2">
-            <a:extLst>
-              <a:ext uri="{FF2B5EF4-FFF2-40B4-BE49-F238E27FC236}">
-                <a16:creationId xmlns:a16="http://schemas.microsoft.com/office/drawing/2014/main" id="{E5D611CC-C6A8-398E-A6AF-6754A2491D98}"/>
-              </a:ext>
-            </a:extLst>
-          </p:cNvPr>
-          <p:cNvSpPr>
-            <a:spLocks noGrp="1"/>
-          </p:cNvSpPr>
-          <p:nvPr>
-            <p:ph idx="1"/>
-          </p:nvPr>
-        </p:nvSpPr>
-        <p:spPr/>
-        <p:txBody>
-          <a:bodyPr/>
-          <a:lstStyle/>
-          <a:p>
-            <a:r>
-              <a:rPr kumimoji="1" lang="ja-JP" altLang="en-US" dirty="0"/>
-              <a:t>複数音源を追加すると、デフォルトでは</a:t>
-            </a:r>
-            <a:r>
-              <a:rPr lang="ja-JP" altLang="en-US" dirty="0"/>
-              <a:t>各音源と</a:t>
-            </a:r>
-            <a:r>
-              <a:rPr kumimoji="1" lang="ja-JP" altLang="en-US" dirty="0"/>
-              <a:t>も同じ</a:t>
-            </a:r>
-            <a:r>
-              <a:rPr kumimoji="1" lang="en-US" altLang="ja-JP" dirty="0"/>
-              <a:t>MIDI </a:t>
-            </a:r>
-            <a:r>
-              <a:rPr kumimoji="1" lang="en-US" altLang="ja-JP" dirty="0" err="1"/>
-              <a:t>ch</a:t>
-            </a:r>
-            <a:r>
-              <a:rPr kumimoji="1" lang="ja-JP" altLang="en-US" dirty="0"/>
-              <a:t>を受信してしまいます。</a:t>
-            </a:r>
-            <a:endParaRPr kumimoji="1" lang="en-US" altLang="ja-JP" dirty="0"/>
-          </a:p>
-          <a:p>
-            <a:r>
-              <a:rPr kumimoji="1" lang="ja-JP" altLang="en-US" dirty="0"/>
-              <a:t>それぞれで受信する</a:t>
-            </a:r>
-            <a:r>
-              <a:rPr lang="en-US" altLang="ja-JP" dirty="0"/>
-              <a:t>MIDI </a:t>
-            </a:r>
-            <a:r>
-              <a:rPr lang="en-US" altLang="ja-JP" dirty="0" err="1"/>
-              <a:t>ch</a:t>
-            </a:r>
-            <a:r>
-              <a:rPr lang="ja-JP" altLang="en-US" dirty="0"/>
-              <a:t>を設定する場合は以下の</a:t>
-            </a:r>
-            <a:r>
-              <a:rPr lang="en-US" altLang="ja-JP" dirty="0"/>
-              <a:t>[Channels]</a:t>
-            </a:r>
-            <a:r>
-              <a:rPr lang="ja-JP" altLang="en-US" dirty="0"/>
-              <a:t>で設定します</a:t>
-            </a:r>
-            <a:endParaRPr kumimoji="1" lang="ja-JP" altLang="en-US" dirty="0"/>
-          </a:p>
-        </p:txBody>
-      </p:sp>
-      <p:sp>
-        <p:nvSpPr>
-          <p:cNvPr id="4" name="スライド番号プレースホルダー 3">
-            <a:extLst>
-              <a:ext uri="{FF2B5EF4-FFF2-40B4-BE49-F238E27FC236}">
-                <a16:creationId xmlns:a16="http://schemas.microsoft.com/office/drawing/2014/main" id="{DE0557E0-CE7A-39C9-66C4-23CAC19221CE}"/>
-              </a:ext>
-            </a:extLst>
-          </p:cNvPr>
-          <p:cNvSpPr>
-            <a:spLocks noGrp="1"/>
-          </p:cNvSpPr>
-          <p:nvPr>
-            <p:ph type="sldNum" sz="quarter" idx="12"/>
-          </p:nvPr>
-        </p:nvSpPr>
-        <p:spPr/>
-        <p:txBody>
-          <a:bodyPr/>
-          <a:lstStyle/>
-          <a:p>
-            <a:fld id="{E27E2812-4560-4165-A7C7-9C013F955547}" type="slidenum">
-              <a:rPr kumimoji="1" lang="ja-JP" altLang="en-US" smtClean="0"/>
-              <a:t>11</a:t>
-            </a:fld>
-            <a:endParaRPr kumimoji="1" lang="ja-JP" altLang="en-US"/>
-          </a:p>
-        </p:txBody>
-      </p:sp>
-      <p:pic>
-        <p:nvPicPr>
-          <p:cNvPr id="6" name="図 5">
-            <a:extLst>
-              <a:ext uri="{FF2B5EF4-FFF2-40B4-BE49-F238E27FC236}">
-                <a16:creationId xmlns:a16="http://schemas.microsoft.com/office/drawing/2014/main" id="{7CBCE10E-7CB5-1982-F5BD-7646B0B47144}"/>
-              </a:ext>
-            </a:extLst>
-          </p:cNvPr>
-          <p:cNvPicPr>
-            <a:picLocks noChangeAspect="1"/>
-          </p:cNvPicPr>
-          <p:nvPr/>
-        </p:nvPicPr>
-        <p:blipFill>
-          <a:blip r:embed="rId2"/>
-          <a:stretch>
-            <a:fillRect/>
-          </a:stretch>
-        </p:blipFill>
-        <p:spPr>
-          <a:xfrm>
-            <a:off x="3006062" y="3464793"/>
-            <a:ext cx="4228626" cy="3114326"/>
-          </a:xfrm>
-          <a:prstGeom prst="rect">
-            <a:avLst/>
-          </a:prstGeom>
-        </p:spPr>
-      </p:pic>
-      <p:sp>
-        <p:nvSpPr>
-          <p:cNvPr id="7" name="四角形: 角を丸くする 6">
-            <a:extLst>
-              <a:ext uri="{FF2B5EF4-FFF2-40B4-BE49-F238E27FC236}">
-                <a16:creationId xmlns:a16="http://schemas.microsoft.com/office/drawing/2014/main" id="{77F2CDA3-1AE2-4452-6A90-B9E9FCBE973F}"/>
-              </a:ext>
-            </a:extLst>
-          </p:cNvPr>
-          <p:cNvSpPr/>
-          <p:nvPr/>
-        </p:nvSpPr>
-        <p:spPr>
-          <a:xfrm>
-            <a:off x="4426103" y="3892257"/>
-            <a:ext cx="2319754" cy="2623562"/>
-          </a:xfrm>
-          <a:prstGeom prst="roundRect">
-            <a:avLst/>
-          </a:prstGeom>
-          <a:noFill/>
-          <a:ln w="76200" cap="flat" cmpd="sng" algn="ctr">
-            <a:solidFill>
-              <a:schemeClr val="accent1"/>
-            </a:solidFill>
-            <a:prstDash val="solid"/>
-            <a:round/>
-            <a:headEnd type="none" w="med" len="med"/>
-            <a:tailEnd type="none" w="med" len="med"/>
-          </a:ln>
-        </p:spPr>
-        <p:style>
-          <a:lnRef idx="0">
-            <a:scrgbClr r="0" g="0" b="0"/>
-          </a:lnRef>
-          <a:fillRef idx="0">
-            <a:scrgbClr r="0" g="0" b="0"/>
-          </a:fillRef>
-          <a:effectRef idx="0">
-            <a:scrgbClr r="0" g="0" b="0"/>
-          </a:effectRef>
-          <a:fontRef idx="minor">
-            <a:schemeClr val="accent1"/>
-          </a:fontRef>
-        </p:style>
-        <p:txBody>
-          <a:bodyPr rtlCol="0" anchor="ctr"/>
-          <a:lstStyle/>
-          <a:p>
-            <a:pPr algn="ctr"/>
-            <a:endParaRPr kumimoji="1" lang="ja-JP" altLang="en-US"/>
-          </a:p>
-        </p:txBody>
-      </p:sp>
-    </p:spTree>
-    <p:extLst>
-      <p:ext uri="{BB962C8B-B14F-4D97-AF65-F5344CB8AC3E}">
-        <p14:creationId xmlns:p14="http://schemas.microsoft.com/office/powerpoint/2010/main" val="2422487152"/>
-      </p:ext>
-    </p:extLst>
-  </p:cSld>
-  <p:clrMapOvr>
-    <a:masterClrMapping/>
-  </p:clrMapOvr>
-</p:sld>
-</file>
-
-<file path=ppt/slides/slide12.xml><?xml version="1.0" encoding="utf-8"?>
-<p:sld xmlns:a="http://schemas.openxmlformats.org/drawingml/2006/main" xmlns:r="http://schemas.openxmlformats.org/officeDocument/2006/relationships" xmlns:p="http://schemas.openxmlformats.org/presentationml/2006/main">
-  <p:cSld>
-    <p:spTree>
-      <p:nvGrpSpPr>
-        <p:cNvPr id="1" name=""/>
-        <p:cNvGrpSpPr/>
-        <p:nvPr/>
-      </p:nvGrpSpPr>
-      <p:grpSpPr>
-        <a:xfrm>
-          <a:off x="0" y="0"/>
-          <a:ext cx="0" cy="0"/>
-          <a:chOff x="0" y="0"/>
-          <a:chExt cx="0" cy="0"/>
-        </a:xfrm>
-      </p:grpSpPr>
-      <p:sp>
-        <p:nvSpPr>
-          <p:cNvPr id="2" name="タイトル 1">
-            <a:extLst>
-              <a:ext uri="{FF2B5EF4-FFF2-40B4-BE49-F238E27FC236}">
-                <a16:creationId xmlns:a16="http://schemas.microsoft.com/office/drawing/2014/main" id="{F865C3BD-EF86-B649-E99B-4BA2FE5082BB}"/>
-              </a:ext>
-            </a:extLst>
-          </p:cNvPr>
-          <p:cNvSpPr>
-            <a:spLocks noGrp="1"/>
-          </p:cNvSpPr>
-          <p:nvPr>
-            <p:ph type="title"/>
-          </p:nvPr>
-        </p:nvSpPr>
-        <p:spPr/>
-        <p:txBody>
-          <a:bodyPr/>
-          <a:lstStyle/>
-          <a:p>
-            <a:r>
-              <a:rPr kumimoji="1" lang="ja-JP" altLang="en-US" dirty="0"/>
-              <a:t>設定を</a:t>
-            </a:r>
-            <a:r>
-              <a:rPr lang="ja-JP" altLang="en-US" dirty="0"/>
-              <a:t>別の場所にエクスポートする</a:t>
-            </a:r>
-            <a:endParaRPr kumimoji="1" lang="ja-JP" altLang="en-US" dirty="0"/>
-          </a:p>
-        </p:txBody>
-      </p:sp>
-      <p:sp>
-        <p:nvSpPr>
-          <p:cNvPr id="3" name="コンテンツ プレースホルダー 2">
-            <a:extLst>
-              <a:ext uri="{FF2B5EF4-FFF2-40B4-BE49-F238E27FC236}">
-                <a16:creationId xmlns:a16="http://schemas.microsoft.com/office/drawing/2014/main" id="{E5D611CC-C6A8-398E-A6AF-6754A2491D98}"/>
-              </a:ext>
-            </a:extLst>
-          </p:cNvPr>
-          <p:cNvSpPr>
-            <a:spLocks noGrp="1"/>
-          </p:cNvSpPr>
-          <p:nvPr>
-            <p:ph idx="1"/>
-          </p:nvPr>
-        </p:nvSpPr>
-        <p:spPr/>
-        <p:txBody>
-          <a:bodyPr/>
-          <a:lstStyle/>
-          <a:p>
-            <a:pPr marL="0" indent="0">
-              <a:buNone/>
-            </a:pPr>
-            <a:r>
-              <a:rPr kumimoji="1" lang="en-US" altLang="ja-JP" dirty="0"/>
-              <a:t>[Mami</a:t>
-            </a:r>
-            <a:r>
-              <a:rPr kumimoji="1" lang="ja-JP" altLang="en-US" dirty="0"/>
-              <a:t>ファイルをエクスポート</a:t>
-            </a:r>
-            <a:r>
-              <a:rPr kumimoji="1" lang="en-US" altLang="ja-JP" dirty="0"/>
-              <a:t>]</a:t>
-            </a:r>
-            <a:r>
-              <a:rPr kumimoji="1" lang="ja-JP" altLang="en-US" dirty="0"/>
-              <a:t>を選んでください。</a:t>
-            </a:r>
-            <a:endParaRPr kumimoji="1" lang="en-US" altLang="ja-JP" dirty="0"/>
-          </a:p>
-          <a:p>
-            <a:pPr marL="0" indent="0">
-              <a:buNone/>
-            </a:pPr>
-            <a:endParaRPr lang="en-US" altLang="ja-JP" dirty="0"/>
-          </a:p>
-          <a:p>
-            <a:pPr marL="0" indent="0">
-              <a:buNone/>
-            </a:pPr>
-            <a:endParaRPr kumimoji="1" lang="en-US" altLang="ja-JP" dirty="0"/>
-          </a:p>
-          <a:p>
-            <a:pPr marL="0" indent="0">
-              <a:buNone/>
-            </a:pPr>
-            <a:endParaRPr lang="en-US" altLang="ja-JP" dirty="0"/>
-          </a:p>
-          <a:p>
-            <a:pPr marL="0" indent="0">
-              <a:buNone/>
-            </a:pPr>
-            <a:endParaRPr kumimoji="1" lang="en-US" altLang="ja-JP" dirty="0"/>
-          </a:p>
-          <a:p>
-            <a:pPr marL="0" indent="0">
-              <a:buNone/>
-            </a:pPr>
-            <a:r>
-              <a:rPr lang="en-US" altLang="ja-JP" dirty="0"/>
-              <a:t>*.Mami</a:t>
-            </a:r>
-            <a:r>
-              <a:rPr lang="ja-JP" altLang="en-US" dirty="0"/>
-              <a:t>ファイルを読み込む場合は、、ここにドロップします</a:t>
-            </a:r>
-            <a:endParaRPr kumimoji="1" lang="ja-JP" altLang="en-US" dirty="0"/>
-          </a:p>
-        </p:txBody>
-      </p:sp>
-      <p:sp>
-        <p:nvSpPr>
-          <p:cNvPr id="4" name="スライド番号プレースホルダー 3">
-            <a:extLst>
-              <a:ext uri="{FF2B5EF4-FFF2-40B4-BE49-F238E27FC236}">
-                <a16:creationId xmlns:a16="http://schemas.microsoft.com/office/drawing/2014/main" id="{DE0557E0-CE7A-39C9-66C4-23CAC19221CE}"/>
-              </a:ext>
-            </a:extLst>
-          </p:cNvPr>
-          <p:cNvSpPr>
-            <a:spLocks noGrp="1"/>
-          </p:cNvSpPr>
-          <p:nvPr>
-            <p:ph type="sldNum" sz="quarter" idx="12"/>
-          </p:nvPr>
-        </p:nvSpPr>
-        <p:spPr/>
-        <p:txBody>
-          <a:bodyPr/>
-          <a:lstStyle/>
-          <a:p>
-            <a:fld id="{E27E2812-4560-4165-A7C7-9C013F955547}" type="slidenum">
-              <a:rPr kumimoji="1" lang="ja-JP" altLang="en-US" smtClean="0"/>
-              <a:t>12</a:t>
-            </a:fld>
-            <a:endParaRPr kumimoji="1" lang="ja-JP" altLang="en-US"/>
-          </a:p>
-        </p:txBody>
-      </p:sp>
-      <p:pic>
-        <p:nvPicPr>
-          <p:cNvPr id="7" name="図 6">
-            <a:extLst>
-              <a:ext uri="{FF2B5EF4-FFF2-40B4-BE49-F238E27FC236}">
-                <a16:creationId xmlns:a16="http://schemas.microsoft.com/office/drawing/2014/main" id="{B1E8C628-0953-377B-80CD-03E69D31F2AE}"/>
-              </a:ext>
-            </a:extLst>
-          </p:cNvPr>
-          <p:cNvPicPr>
-            <a:picLocks noChangeAspect="1"/>
-          </p:cNvPicPr>
-          <p:nvPr/>
-        </p:nvPicPr>
-        <p:blipFill>
-          <a:blip r:embed="rId3"/>
-          <a:stretch>
-            <a:fillRect/>
-          </a:stretch>
-        </p:blipFill>
-        <p:spPr>
-          <a:xfrm>
-            <a:off x="2970952" y="2596859"/>
-            <a:ext cx="2972058" cy="1181202"/>
-          </a:xfrm>
-          <a:prstGeom prst="rect">
-            <a:avLst/>
-          </a:prstGeom>
-        </p:spPr>
-      </p:pic>
-      <p:sp>
-        <p:nvSpPr>
-          <p:cNvPr id="8" name="四角形: 角を丸くする 7">
-            <a:extLst>
-              <a:ext uri="{FF2B5EF4-FFF2-40B4-BE49-F238E27FC236}">
-                <a16:creationId xmlns:a16="http://schemas.microsoft.com/office/drawing/2014/main" id="{0A262E4F-82D0-BD10-3B0E-D6E13F0396B9}"/>
-              </a:ext>
-            </a:extLst>
-          </p:cNvPr>
-          <p:cNvSpPr/>
-          <p:nvPr/>
-        </p:nvSpPr>
-        <p:spPr>
-          <a:xfrm>
-            <a:off x="3080381" y="3498920"/>
-            <a:ext cx="3676977" cy="419819"/>
-          </a:xfrm>
-          <a:prstGeom prst="roundRect">
-            <a:avLst/>
-          </a:prstGeom>
-          <a:noFill/>
-          <a:ln w="76200" cap="flat" cmpd="sng" algn="ctr">
-            <a:solidFill>
-              <a:schemeClr val="accent1"/>
-            </a:solidFill>
-            <a:prstDash val="solid"/>
-            <a:round/>
-            <a:headEnd type="none" w="med" len="med"/>
-            <a:tailEnd type="none" w="med" len="med"/>
-          </a:ln>
-        </p:spPr>
-        <p:style>
-          <a:lnRef idx="0">
-            <a:scrgbClr r="0" g="0" b="0"/>
-          </a:lnRef>
-          <a:fillRef idx="0">
-            <a:scrgbClr r="0" g="0" b="0"/>
-          </a:fillRef>
-          <a:effectRef idx="0">
-            <a:scrgbClr r="0" g="0" b="0"/>
-          </a:effectRef>
-          <a:fontRef idx="minor">
-            <a:schemeClr val="accent1"/>
-          </a:fontRef>
-        </p:style>
-        <p:txBody>
-          <a:bodyPr rtlCol="0" anchor="ctr"/>
-          <a:lstStyle/>
-          <a:p>
-            <a:pPr algn="ctr"/>
-            <a:endParaRPr kumimoji="1" lang="ja-JP" altLang="en-US"/>
-          </a:p>
-        </p:txBody>
-      </p:sp>
-      <p:pic>
-        <p:nvPicPr>
-          <p:cNvPr id="6" name="図 5">
-            <a:extLst>
-              <a:ext uri="{FF2B5EF4-FFF2-40B4-BE49-F238E27FC236}">
-                <a16:creationId xmlns:a16="http://schemas.microsoft.com/office/drawing/2014/main" id="{46C3DCC6-5AAF-EDB5-B8A8-5CFD29DBD034}"/>
-              </a:ext>
-            </a:extLst>
-          </p:cNvPr>
-          <p:cNvPicPr>
-            <a:picLocks noChangeAspect="1"/>
-          </p:cNvPicPr>
-          <p:nvPr/>
-        </p:nvPicPr>
-        <p:blipFill>
-          <a:blip r:embed="rId4"/>
-          <a:stretch>
-            <a:fillRect/>
-          </a:stretch>
-        </p:blipFill>
-        <p:spPr>
-          <a:xfrm>
-            <a:off x="3313882" y="4491897"/>
-            <a:ext cx="2286198" cy="2141406"/>
-          </a:xfrm>
-          <a:prstGeom prst="rect">
-            <a:avLst/>
-          </a:prstGeom>
-        </p:spPr>
-      </p:pic>
-    </p:spTree>
-    <p:extLst>
-      <p:ext uri="{BB962C8B-B14F-4D97-AF65-F5344CB8AC3E}">
-        <p14:creationId xmlns:p14="http://schemas.microsoft.com/office/powerpoint/2010/main" val="43114691"/>
-      </p:ext>
-    </p:extLst>
-  </p:cSld>
-  <p:clrMapOvr>
-    <a:masterClrMapping/>
-  </p:clrMapOvr>
-</p:sld>
-</file>
-
-<file path=ppt/slides/slide13.xml><?xml version="1.0" encoding="utf-8"?>
-<p:sld xmlns:a="http://schemas.openxmlformats.org/drawingml/2006/main" xmlns:r="http://schemas.openxmlformats.org/officeDocument/2006/relationships" xmlns:p="http://schemas.openxmlformats.org/presentationml/2006/main">
-  <p:cSld>
-    <p:spTree>
-      <p:nvGrpSpPr>
-        <p:cNvPr id="1" name=""/>
-        <p:cNvGrpSpPr/>
-        <p:nvPr/>
-      </p:nvGrpSpPr>
-      <p:grpSpPr>
-        <a:xfrm>
-          <a:off x="0" y="0"/>
-          <a:ext cx="0" cy="0"/>
-          <a:chOff x="0" y="0"/>
-          <a:chExt cx="0" cy="0"/>
-        </a:xfrm>
-      </p:grpSpPr>
-      <p:sp>
-        <p:nvSpPr>
-          <p:cNvPr id="2" name="タイトル 1">
-            <a:extLst>
-              <a:ext uri="{FF2B5EF4-FFF2-40B4-BE49-F238E27FC236}">
-                <a16:creationId xmlns:a16="http://schemas.microsoft.com/office/drawing/2014/main" id="{4C1A3DC7-ECC4-FF84-B971-9DF2A72B462C}"/>
-              </a:ext>
-            </a:extLst>
-          </p:cNvPr>
-          <p:cNvSpPr>
-            <a:spLocks noGrp="1"/>
-          </p:cNvSpPr>
-          <p:nvPr>
-            <p:ph type="title"/>
-          </p:nvPr>
-        </p:nvSpPr>
-        <p:spPr/>
-        <p:txBody>
-          <a:bodyPr/>
-          <a:lstStyle/>
-          <a:p>
-            <a:endParaRPr kumimoji="1" lang="ja-JP" altLang="en-US" dirty="0"/>
-          </a:p>
-        </p:txBody>
-      </p:sp>
-      <p:sp>
-        <p:nvSpPr>
-          <p:cNvPr id="3" name="コンテンツ プレースホルダー 2">
-            <a:extLst>
-              <a:ext uri="{FF2B5EF4-FFF2-40B4-BE49-F238E27FC236}">
-                <a16:creationId xmlns:a16="http://schemas.microsoft.com/office/drawing/2014/main" id="{BD7CD47C-A3BF-24B9-9F64-39D20F0D1549}"/>
-              </a:ext>
-            </a:extLst>
-          </p:cNvPr>
-          <p:cNvSpPr>
-            <a:spLocks noGrp="1"/>
-          </p:cNvSpPr>
-          <p:nvPr>
-            <p:ph idx="1"/>
-          </p:nvPr>
-        </p:nvSpPr>
-        <p:spPr/>
-        <p:txBody>
-          <a:bodyPr/>
-          <a:lstStyle/>
-          <a:p>
-            <a:r>
-              <a:rPr kumimoji="1" lang="ja-JP" altLang="en-US" dirty="0"/>
-              <a:t>ザックリとした説明ですが以上です。</a:t>
-            </a:r>
-            <a:r>
-              <a:rPr lang="ja-JP" altLang="en-US" dirty="0"/>
-              <a:t>マニュアルの方にもいくつか情報が記載されていますので参照ください。</a:t>
-            </a:r>
-            <a:br>
-              <a:rPr lang="en-US" altLang="ja-JP" dirty="0"/>
-            </a:br>
-            <a:br>
-              <a:rPr lang="en-US" altLang="ja-JP" dirty="0"/>
-            </a:br>
-            <a:r>
-              <a:rPr lang="en-US" altLang="ja-JP" dirty="0">
-                <a:hlinkClick r:id="rId2"/>
-              </a:rPr>
-              <a:t>https://github.com/110-kenichi/mame/blob/master/docs/MAmidiMEmo/Manual.pdf</a:t>
-            </a:r>
-            <a:br>
-              <a:rPr lang="en-US" altLang="ja-JP" dirty="0"/>
-            </a:br>
-            <a:endParaRPr lang="en-US" altLang="ja-JP" dirty="0"/>
-          </a:p>
-          <a:p>
-            <a:r>
-              <a:rPr kumimoji="1" lang="ja-JP" altLang="en-US" dirty="0"/>
-              <a:t>なにかあれば、お手数ですが</a:t>
-            </a:r>
-            <a:r>
-              <a:rPr kumimoji="1" lang="en-US" altLang="ja-JP" dirty="0"/>
-              <a:t>DM</a:t>
-            </a:r>
-            <a:r>
-              <a:rPr kumimoji="1" lang="ja-JP" altLang="en-US" dirty="0"/>
-              <a:t>などください</a:t>
-            </a:r>
-            <a:endParaRPr kumimoji="1" lang="en-US" altLang="ja-JP" dirty="0"/>
-          </a:p>
-          <a:p>
-            <a:endParaRPr kumimoji="1" lang="ja-JP" altLang="en-US" dirty="0"/>
-          </a:p>
-        </p:txBody>
-      </p:sp>
-      <p:sp>
-        <p:nvSpPr>
-          <p:cNvPr id="4" name="スライド番号プレースホルダー 3">
-            <a:extLst>
-              <a:ext uri="{FF2B5EF4-FFF2-40B4-BE49-F238E27FC236}">
-                <a16:creationId xmlns:a16="http://schemas.microsoft.com/office/drawing/2014/main" id="{4EC99D5F-8BB3-1DC2-F9C5-EDFF3CCD7543}"/>
-              </a:ext>
-            </a:extLst>
-          </p:cNvPr>
-          <p:cNvSpPr>
-            <a:spLocks noGrp="1"/>
-          </p:cNvSpPr>
-          <p:nvPr>
-            <p:ph type="sldNum" sz="quarter" idx="12"/>
-          </p:nvPr>
-        </p:nvSpPr>
-        <p:spPr/>
-        <p:txBody>
-          <a:bodyPr/>
-          <a:lstStyle/>
-          <a:p>
-            <a:fld id="{E27E2812-4560-4165-A7C7-9C013F955547}" type="slidenum">
-              <a:rPr kumimoji="1" lang="ja-JP" altLang="en-US" smtClean="0"/>
-              <a:t>13</a:t>
-            </a:fld>
-            <a:endParaRPr kumimoji="1" lang="ja-JP" altLang="en-US"/>
-          </a:p>
-        </p:txBody>
-      </p:sp>
-    </p:spTree>
-    <p:extLst>
-      <p:ext uri="{BB962C8B-B14F-4D97-AF65-F5344CB8AC3E}">
-        <p14:creationId xmlns:p14="http://schemas.microsoft.com/office/powerpoint/2010/main" val="3794187595"/>
-      </p:ext>
-    </p:extLst>
-  </p:cSld>
-  <p:clrMapOvr>
-    <a:masterClrMapping/>
-  </p:clrMapOvr>
-</p:sld>
-</file>
-
-<file path=ppt/slides/slide2.xml><?xml version="1.0" encoding="utf-8"?>
-<p:sld xmlns:a="http://schemas.openxmlformats.org/drawingml/2006/main" xmlns:r="http://schemas.openxmlformats.org/officeDocument/2006/relationships" xmlns:p="http://schemas.openxmlformats.org/presentationml/2006/main">
-  <p:cSld>
-    <p:spTree>
-      <p:nvGrpSpPr>
-        <p:cNvPr id="1" name=""/>
-        <p:cNvGrpSpPr/>
-        <p:nvPr/>
-      </p:nvGrpSpPr>
-      <p:grpSpPr>
-        <a:xfrm>
-          <a:off x="0" y="0"/>
-          <a:ext cx="0" cy="0"/>
-          <a:chOff x="0" y="0"/>
-          <a:chExt cx="0" cy="0"/>
-        </a:xfrm>
-      </p:grpSpPr>
-      <p:sp>
-        <p:nvSpPr>
-          <p:cNvPr id="2" name="タイトル 1">
-            <a:extLst>
-              <a:ext uri="{FF2B5EF4-FFF2-40B4-BE49-F238E27FC236}">
-                <a16:creationId xmlns:a16="http://schemas.microsoft.com/office/drawing/2014/main" id="{F865C3BD-EF86-B649-E99B-4BA2FE5082BB}"/>
-              </a:ext>
-            </a:extLst>
-          </p:cNvPr>
-          <p:cNvSpPr>
-            <a:spLocks noGrp="1"/>
-          </p:cNvSpPr>
-          <p:nvPr>
-            <p:ph type="title"/>
-          </p:nvPr>
-        </p:nvSpPr>
-        <p:spPr/>
-        <p:txBody>
-          <a:bodyPr/>
-          <a:lstStyle/>
-          <a:p>
-            <a:r>
-              <a:rPr kumimoji="1" lang="en-US" altLang="ja-JP" dirty="0" err="1"/>
-              <a:t>MAmidiMEmo</a:t>
-            </a:r>
-            <a:r>
-              <a:rPr kumimoji="1" lang="ja-JP" altLang="en-US" dirty="0"/>
-              <a:t>の</a:t>
-            </a:r>
-            <a:r>
-              <a:rPr kumimoji="1" lang="en-US" altLang="ja-JP" dirty="0"/>
-              <a:t>VST2</a:t>
-            </a:r>
-            <a:r>
-              <a:rPr kumimoji="1" lang="ja-JP" altLang="en-US" dirty="0"/>
-              <a:t>音源としてインストールする</a:t>
-            </a:r>
-          </a:p>
-        </p:txBody>
-      </p:sp>
-      <p:sp>
-        <p:nvSpPr>
-          <p:cNvPr id="4" name="スライド番号プレースホルダー 3">
-            <a:extLst>
-              <a:ext uri="{FF2B5EF4-FFF2-40B4-BE49-F238E27FC236}">
-                <a16:creationId xmlns:a16="http://schemas.microsoft.com/office/drawing/2014/main" id="{DE0557E0-CE7A-39C9-66C4-23CAC19221CE}"/>
-              </a:ext>
-            </a:extLst>
-          </p:cNvPr>
-          <p:cNvSpPr>
-            <a:spLocks noGrp="1"/>
-          </p:cNvSpPr>
-          <p:nvPr>
-            <p:ph type="sldNum" sz="quarter" idx="12"/>
-          </p:nvPr>
-        </p:nvSpPr>
-        <p:spPr/>
-        <p:txBody>
-          <a:bodyPr/>
-          <a:lstStyle/>
-          <a:p>
-            <a:fld id="{E27E2812-4560-4165-A7C7-9C013F955547}" type="slidenum">
-              <a:rPr kumimoji="1" lang="ja-JP" altLang="en-US" smtClean="0"/>
-              <a:t>2</a:t>
+              <a:t>3</a:t>
             </a:fld>
             <a:endParaRPr kumimoji="1" lang="ja-JP" altLang="en-US"/>
           </a:p>
@@ -11513,7 +12211,7 @@
 </p:sld>
 </file>
 
-<file path=ppt/slides/slide3.xml><?xml version="1.0" encoding="utf-8"?>
+<file path=ppt/slides/slide4.xml><?xml version="1.0" encoding="utf-8"?>
 <p:sld xmlns:a="http://schemas.openxmlformats.org/drawingml/2006/main" xmlns:r="http://schemas.openxmlformats.org/officeDocument/2006/relationships" xmlns:p="http://schemas.openxmlformats.org/presentationml/2006/main">
   <p:cSld>
     <p:spTree>
@@ -11630,7 +12328,7 @@
           <a:p>
             <a:fld id="{E27E2812-4560-4165-A7C7-9C013F955547}" type="slidenum">
               <a:rPr kumimoji="1" lang="ja-JP" altLang="en-US" smtClean="0"/>
-              <a:t>3</a:t>
+              <a:t>4</a:t>
             </a:fld>
             <a:endParaRPr kumimoji="1" lang="ja-JP" altLang="en-US"/>
           </a:p>
@@ -12099,7 +12797,7 @@
 </p:sld>
 </file>
 
-<file path=ppt/slides/slide4.xml><?xml version="1.0" encoding="utf-8"?>
+<file path=ppt/slides/slide5.xml><?xml version="1.0" encoding="utf-8"?>
 <p:sld xmlns:a="http://schemas.openxmlformats.org/drawingml/2006/main" xmlns:r="http://schemas.openxmlformats.org/officeDocument/2006/relationships" xmlns:p="http://schemas.openxmlformats.org/presentationml/2006/main">
   <p:cSld>
     <p:spTree>
@@ -12223,7 +12921,7 @@
           <a:p>
             <a:fld id="{E27E2812-4560-4165-A7C7-9C013F955547}" type="slidenum">
               <a:rPr kumimoji="1" lang="ja-JP" altLang="en-US" smtClean="0"/>
-              <a:t>4</a:t>
+              <a:t>5</a:t>
             </a:fld>
             <a:endParaRPr kumimoji="1" lang="ja-JP" altLang="en-US"/>
           </a:p>
@@ -12646,7 +13344,7 @@
 </p:sld>
 </file>
 
-<file path=ppt/slides/slide5.xml><?xml version="1.0" encoding="utf-8"?>
+<file path=ppt/slides/slide6.xml><?xml version="1.0" encoding="utf-8"?>
 <p:sld xmlns:a="http://schemas.openxmlformats.org/drawingml/2006/main" xmlns:r="http://schemas.openxmlformats.org/officeDocument/2006/relationships" xmlns:p="http://schemas.openxmlformats.org/presentationml/2006/main">
   <p:cSld>
     <p:spTree>
@@ -12722,7 +13420,7 @@
           <a:p>
             <a:fld id="{E27E2812-4560-4165-A7C7-9C013F955547}" type="slidenum">
               <a:rPr kumimoji="1" lang="ja-JP" altLang="en-US" smtClean="0"/>
-              <a:t>5</a:t>
+              <a:t>6</a:t>
             </a:fld>
             <a:endParaRPr kumimoji="1" lang="ja-JP" altLang="en-US"/>
           </a:p>
@@ -12865,7 +13563,7 @@
 </p:sld>
 </file>
 
-<file path=ppt/slides/slide6.xml><?xml version="1.0" encoding="utf-8"?>
+<file path=ppt/slides/slide7.xml><?xml version="1.0" encoding="utf-8"?>
 <p:sld xmlns:a="http://schemas.openxmlformats.org/drawingml/2006/main" xmlns:r="http://schemas.openxmlformats.org/officeDocument/2006/relationships" xmlns:p="http://schemas.openxmlformats.org/presentationml/2006/main">
   <p:cSld>
     <p:spTree>
@@ -12990,7 +13688,7 @@
           <a:p>
             <a:fld id="{E27E2812-4560-4165-A7C7-9C013F955547}" type="slidenum">
               <a:rPr kumimoji="1" lang="ja-JP" altLang="en-US" smtClean="0"/>
-              <a:t>6</a:t>
+              <a:t>7</a:t>
             </a:fld>
             <a:endParaRPr kumimoji="1" lang="ja-JP" altLang="en-US"/>
           </a:p>
@@ -13269,7 +13967,7 @@
 </p:sld>
 </file>
 
-<file path=ppt/slides/slide7.xml><?xml version="1.0" encoding="utf-8"?>
+<file path=ppt/slides/slide8.xml><?xml version="1.0" encoding="utf-8"?>
 <p:sld xmlns:a="http://schemas.openxmlformats.org/drawingml/2006/main" xmlns:r="http://schemas.openxmlformats.org/officeDocument/2006/relationships" xmlns:p="http://schemas.openxmlformats.org/presentationml/2006/main">
   <p:cSld>
     <p:spTree>
@@ -13358,7 +14056,7 @@
           <a:p>
             <a:fld id="{E27E2812-4560-4165-A7C7-9C013F955547}" type="slidenum">
               <a:rPr kumimoji="1" lang="ja-JP" altLang="en-US" smtClean="0"/>
-              <a:t>7</a:t>
+              <a:t>8</a:t>
             </a:fld>
             <a:endParaRPr kumimoji="1" lang="ja-JP" altLang="en-US"/>
           </a:p>
@@ -13461,7 +14159,7 @@
 </p:sld>
 </file>
 
-<file path=ppt/slides/slide8.xml><?xml version="1.0" encoding="utf-8"?>
+<file path=ppt/slides/slide9.xml><?xml version="1.0" encoding="utf-8"?>
 <p:sld xmlns:a="http://schemas.openxmlformats.org/drawingml/2006/main" xmlns:r="http://schemas.openxmlformats.org/officeDocument/2006/relationships" xmlns:p="http://schemas.openxmlformats.org/presentationml/2006/main">
   <p:cSld>
     <p:spTree>
@@ -13550,7 +14248,7 @@
           <a:p>
             <a:fld id="{E27E2812-4560-4165-A7C7-9C013F955547}" type="slidenum">
               <a:rPr kumimoji="1" lang="ja-JP" altLang="en-US" smtClean="0"/>
-              <a:t>8</a:t>
+              <a:t>9</a:t>
             </a:fld>
             <a:endParaRPr kumimoji="1" lang="ja-JP" altLang="en-US"/>
           </a:p>
@@ -14043,395 +14741,6 @@
     <p:extLst>
       <p:ext uri="{BB962C8B-B14F-4D97-AF65-F5344CB8AC3E}">
         <p14:creationId xmlns:p14="http://schemas.microsoft.com/office/powerpoint/2010/main" val="3551220036"/>
-      </p:ext>
-    </p:extLst>
-  </p:cSld>
-  <p:clrMapOvr>
-    <a:masterClrMapping/>
-  </p:clrMapOvr>
-</p:sld>
-</file>
-
-<file path=ppt/slides/slide9.xml><?xml version="1.0" encoding="utf-8"?>
-<p:sld xmlns:a="http://schemas.openxmlformats.org/drawingml/2006/main" xmlns:r="http://schemas.openxmlformats.org/officeDocument/2006/relationships" xmlns:p="http://schemas.openxmlformats.org/presentationml/2006/main">
-  <p:cSld>
-    <p:spTree>
-      <p:nvGrpSpPr>
-        <p:cNvPr id="1" name=""/>
-        <p:cNvGrpSpPr/>
-        <p:nvPr/>
-      </p:nvGrpSpPr>
-      <p:grpSpPr>
-        <a:xfrm>
-          <a:off x="0" y="0"/>
-          <a:ext cx="0" cy="0"/>
-          <a:chOff x="0" y="0"/>
-          <a:chExt cx="0" cy="0"/>
-        </a:xfrm>
-      </p:grpSpPr>
-      <p:sp>
-        <p:nvSpPr>
-          <p:cNvPr id="2" name="タイトル 1">
-            <a:extLst>
-              <a:ext uri="{FF2B5EF4-FFF2-40B4-BE49-F238E27FC236}">
-                <a16:creationId xmlns:a16="http://schemas.microsoft.com/office/drawing/2014/main" id="{F865C3BD-EF86-B649-E99B-4BA2FE5082BB}"/>
-              </a:ext>
-            </a:extLst>
-          </p:cNvPr>
-          <p:cNvSpPr>
-            <a:spLocks noGrp="1"/>
-          </p:cNvSpPr>
-          <p:nvPr>
-            <p:ph type="title"/>
-          </p:nvPr>
-        </p:nvSpPr>
-        <p:spPr/>
-        <p:txBody>
-          <a:bodyPr>
-            <a:normAutofit fontScale="90000"/>
-          </a:bodyPr>
-          <a:lstStyle/>
-          <a:p>
-            <a:r>
-              <a:rPr kumimoji="1" lang="ja-JP" altLang="en-US" b="1" dirty="0"/>
-              <a:t>音色設定</a:t>
-            </a:r>
-            <a:r>
-              <a:rPr kumimoji="1" lang="en-US" altLang="ja-JP" b="1" dirty="0"/>
-              <a:t>4(</a:t>
-            </a:r>
-            <a:r>
-              <a:rPr kumimoji="1" lang="ja-JP" altLang="en-US" b="1" dirty="0"/>
-              <a:t>エキスパート向け</a:t>
-            </a:r>
-            <a:r>
-              <a:rPr kumimoji="1" lang="en-US" altLang="ja-JP" b="1" dirty="0"/>
-              <a:t>)</a:t>
-            </a:r>
-            <a:br>
-              <a:rPr kumimoji="1" lang="en-US" altLang="ja-JP" b="1" dirty="0"/>
-            </a:br>
-            <a:r>
-              <a:rPr kumimoji="1" lang="en-US" altLang="ja-JP" dirty="0"/>
-              <a:t>MIDI</a:t>
-            </a:r>
-            <a:r>
-              <a:rPr kumimoji="1" lang="ja-JP" altLang="en-US" dirty="0"/>
-              <a:t>キーボードのノブ</a:t>
-            </a:r>
-            <a:r>
-              <a:rPr kumimoji="1" lang="en-US" altLang="ja-JP" dirty="0"/>
-              <a:t>/</a:t>
-            </a:r>
-            <a:r>
-              <a:rPr kumimoji="1" lang="ja-JP" altLang="en-US" dirty="0"/>
-              <a:t>スライダなどに音色の変更機能を割り当てられます</a:t>
-            </a:r>
-          </a:p>
-        </p:txBody>
-      </p:sp>
-      <p:sp>
-        <p:nvSpPr>
-          <p:cNvPr id="4" name="スライド番号プレースホルダー 3">
-            <a:extLst>
-              <a:ext uri="{FF2B5EF4-FFF2-40B4-BE49-F238E27FC236}">
-                <a16:creationId xmlns:a16="http://schemas.microsoft.com/office/drawing/2014/main" id="{DE0557E0-CE7A-39C9-66C4-23CAC19221CE}"/>
-              </a:ext>
-            </a:extLst>
-          </p:cNvPr>
-          <p:cNvSpPr>
-            <a:spLocks noGrp="1"/>
-          </p:cNvSpPr>
-          <p:nvPr>
-            <p:ph type="sldNum" sz="quarter" idx="12"/>
-          </p:nvPr>
-        </p:nvSpPr>
-        <p:spPr/>
-        <p:txBody>
-          <a:bodyPr/>
-          <a:lstStyle/>
-          <a:p>
-            <a:fld id="{E27E2812-4560-4165-A7C7-9C013F955547}" type="slidenum">
-              <a:rPr kumimoji="1" lang="ja-JP" altLang="en-US" smtClean="0"/>
-              <a:t>9</a:t>
-            </a:fld>
-            <a:endParaRPr kumimoji="1" lang="ja-JP" altLang="en-US"/>
-          </a:p>
-        </p:txBody>
-      </p:sp>
-      <p:pic>
-        <p:nvPicPr>
-          <p:cNvPr id="17" name="図 16">
-            <a:extLst>
-              <a:ext uri="{FF2B5EF4-FFF2-40B4-BE49-F238E27FC236}">
-                <a16:creationId xmlns:a16="http://schemas.microsoft.com/office/drawing/2014/main" id="{E3B92811-16A6-284B-9E38-43F1F1F995B5}"/>
-              </a:ext>
-            </a:extLst>
-          </p:cNvPr>
-          <p:cNvPicPr>
-            <a:picLocks noChangeAspect="1"/>
-          </p:cNvPicPr>
-          <p:nvPr/>
-        </p:nvPicPr>
-        <p:blipFill>
-          <a:blip r:embed="rId2"/>
-          <a:stretch>
-            <a:fillRect/>
-          </a:stretch>
-        </p:blipFill>
-        <p:spPr>
-          <a:xfrm>
-            <a:off x="821430" y="2265871"/>
-            <a:ext cx="5025459" cy="4368325"/>
-          </a:xfrm>
-          <a:prstGeom prst="rect">
-            <a:avLst/>
-          </a:prstGeom>
-        </p:spPr>
-      </p:pic>
-      <p:sp>
-        <p:nvSpPr>
-          <p:cNvPr id="18" name="四角形: 角を丸くする 17">
-            <a:extLst>
-              <a:ext uri="{FF2B5EF4-FFF2-40B4-BE49-F238E27FC236}">
-                <a16:creationId xmlns:a16="http://schemas.microsoft.com/office/drawing/2014/main" id="{5AA9C2C8-329C-24FA-58B6-E0C6EC79EA78}"/>
-              </a:ext>
-            </a:extLst>
-          </p:cNvPr>
-          <p:cNvSpPr/>
-          <p:nvPr/>
-        </p:nvSpPr>
-        <p:spPr>
-          <a:xfrm>
-            <a:off x="2062700" y="2900958"/>
-            <a:ext cx="3676742" cy="612868"/>
-          </a:xfrm>
-          <a:prstGeom prst="roundRect">
-            <a:avLst/>
-          </a:prstGeom>
-          <a:noFill/>
-          <a:ln w="76200" cap="flat" cmpd="sng" algn="ctr">
-            <a:solidFill>
-              <a:schemeClr val="accent1"/>
-            </a:solidFill>
-            <a:prstDash val="solid"/>
-            <a:round/>
-            <a:headEnd type="none" w="med" len="med"/>
-            <a:tailEnd type="none" w="med" len="med"/>
-          </a:ln>
-        </p:spPr>
-        <p:style>
-          <a:lnRef idx="0">
-            <a:scrgbClr r="0" g="0" b="0"/>
-          </a:lnRef>
-          <a:fillRef idx="0">
-            <a:scrgbClr r="0" g="0" b="0"/>
-          </a:fillRef>
-          <a:effectRef idx="0">
-            <a:scrgbClr r="0" g="0" b="0"/>
-          </a:effectRef>
-          <a:fontRef idx="minor">
-            <a:schemeClr val="accent1"/>
-          </a:fontRef>
-        </p:style>
-        <p:txBody>
-          <a:bodyPr rtlCol="0" anchor="ctr"/>
-          <a:lstStyle/>
-          <a:p>
-            <a:pPr algn="ctr"/>
-            <a:endParaRPr kumimoji="1" lang="ja-JP" altLang="en-US"/>
-          </a:p>
-        </p:txBody>
-      </p:sp>
-      <p:sp>
-        <p:nvSpPr>
-          <p:cNvPr id="19" name="吹き出し: 四角形 18">
-            <a:extLst>
-              <a:ext uri="{FF2B5EF4-FFF2-40B4-BE49-F238E27FC236}">
-                <a16:creationId xmlns:a16="http://schemas.microsoft.com/office/drawing/2014/main" id="{18F6BCD0-1266-7731-09A3-21A25B249CA1}"/>
-              </a:ext>
-            </a:extLst>
-          </p:cNvPr>
-          <p:cNvSpPr/>
-          <p:nvPr/>
-        </p:nvSpPr>
-        <p:spPr>
-          <a:xfrm>
-            <a:off x="6268529" y="2858219"/>
-            <a:ext cx="3605841" cy="984849"/>
-          </a:xfrm>
-          <a:prstGeom prst="wedgeRectCallout">
-            <a:avLst>
-              <a:gd name="adj1" fmla="val -87978"/>
-              <a:gd name="adj2" fmla="val -19397"/>
-            </a:avLst>
-          </a:prstGeom>
-        </p:spPr>
-        <p:style>
-          <a:lnRef idx="1">
-            <a:schemeClr val="accent2"/>
-          </a:lnRef>
-          <a:fillRef idx="2">
-            <a:schemeClr val="accent2"/>
-          </a:fillRef>
-          <a:effectRef idx="1">
-            <a:schemeClr val="accent2"/>
-          </a:effectRef>
-          <a:fontRef idx="minor">
-            <a:schemeClr val="dk1"/>
-          </a:fontRef>
-        </p:style>
-        <p:txBody>
-          <a:bodyPr rtlCol="0" anchor="ctr"/>
-          <a:lstStyle/>
-          <a:p>
-            <a:pPr algn="ctr"/>
-            <a:r>
-              <a:rPr kumimoji="1" lang="en-US" altLang="ja-JP" dirty="0"/>
-              <a:t>CC#70</a:t>
-            </a:r>
-            <a:r>
-              <a:rPr kumimoji="1" lang="ja-JP" altLang="en-US" dirty="0"/>
-              <a:t>～</a:t>
-            </a:r>
-            <a:r>
-              <a:rPr kumimoji="1" lang="en-US" altLang="ja-JP" dirty="0"/>
-              <a:t>79</a:t>
-            </a:r>
-            <a:r>
-              <a:rPr kumimoji="1" lang="ja-JP" altLang="en-US" dirty="0"/>
-              <a:t>のメッセージを送る事で、ここに記載した音色レジスタなどの値を変更できます</a:t>
-            </a:r>
-          </a:p>
-        </p:txBody>
-      </p:sp>
-      <p:sp>
-        <p:nvSpPr>
-          <p:cNvPr id="20" name="吹き出し: 四角形 19">
-            <a:extLst>
-              <a:ext uri="{FF2B5EF4-FFF2-40B4-BE49-F238E27FC236}">
-                <a16:creationId xmlns:a16="http://schemas.microsoft.com/office/drawing/2014/main" id="{808639A7-685C-36FD-DF8F-150EAA5C27E5}"/>
-              </a:ext>
-            </a:extLst>
-          </p:cNvPr>
-          <p:cNvSpPr/>
-          <p:nvPr/>
-        </p:nvSpPr>
-        <p:spPr>
-          <a:xfrm>
-            <a:off x="6159261" y="4313208"/>
-            <a:ext cx="5555411" cy="2191109"/>
-          </a:xfrm>
-          <a:prstGeom prst="wedgeRectCallout">
-            <a:avLst>
-              <a:gd name="adj1" fmla="val -80250"/>
-              <a:gd name="adj2" fmla="val -94296"/>
-            </a:avLst>
-          </a:prstGeom>
-        </p:spPr>
-        <p:style>
-          <a:lnRef idx="1">
-            <a:schemeClr val="accent2"/>
-          </a:lnRef>
-          <a:fillRef idx="2">
-            <a:schemeClr val="accent2"/>
-          </a:fillRef>
-          <a:effectRef idx="1">
-            <a:schemeClr val="accent2"/>
-          </a:effectRef>
-          <a:fontRef idx="minor">
-            <a:schemeClr val="dk1"/>
-          </a:fontRef>
-        </p:style>
-        <p:txBody>
-          <a:bodyPr rtlCol="0" anchor="ctr"/>
-          <a:lstStyle/>
-          <a:p>
-            <a:pPr algn="ctr"/>
-            <a:r>
-              <a:rPr kumimoji="1" lang="ja-JP" altLang="en-US" dirty="0"/>
-              <a:t>例えば「</a:t>
-            </a:r>
-            <a:r>
-              <a:rPr kumimoji="1" lang="en-US" altLang="ja-JP" dirty="0"/>
-              <a:t>Ops[0].TL</a:t>
-            </a:r>
-            <a:r>
-              <a:rPr kumimoji="1" lang="ja-JP" altLang="en-US" dirty="0"/>
-              <a:t>」と書くと、</a:t>
-            </a:r>
-            <a:r>
-              <a:rPr kumimoji="1" lang="en-US" altLang="ja-JP" dirty="0"/>
-              <a:t>CC#70</a:t>
-            </a:r>
-            <a:r>
-              <a:rPr kumimoji="1" lang="ja-JP" altLang="en-US" dirty="0"/>
-              <a:t>の値に合わせてオペレータ</a:t>
-            </a:r>
-            <a:r>
-              <a:rPr kumimoji="1" lang="en-US" altLang="ja-JP" dirty="0"/>
-              <a:t>0</a:t>
-            </a:r>
-            <a:r>
-              <a:rPr kumimoji="1" lang="ja-JP" altLang="en-US" dirty="0"/>
-              <a:t>の</a:t>
-            </a:r>
-            <a:r>
-              <a:rPr kumimoji="1" lang="en-US" altLang="ja-JP" dirty="0"/>
-              <a:t>TL</a:t>
-            </a:r>
-            <a:r>
-              <a:rPr kumimoji="1" lang="ja-JP" altLang="en-US" dirty="0"/>
-              <a:t>値が変化します。</a:t>
-            </a:r>
-            <a:endParaRPr kumimoji="1" lang="en-US" altLang="ja-JP" dirty="0"/>
-          </a:p>
-          <a:p>
-            <a:pPr algn="ctr"/>
-            <a:r>
-              <a:rPr kumimoji="1" lang="ja-JP" altLang="en-US" dirty="0"/>
-              <a:t>四則演算も可能です。</a:t>
-            </a:r>
-            <a:endParaRPr kumimoji="1" lang="en-US" altLang="ja-JP" dirty="0"/>
-          </a:p>
-          <a:p>
-            <a:pPr algn="ctr"/>
-            <a:r>
-              <a:rPr kumimoji="1" lang="en-US" altLang="ja-JP" dirty="0"/>
-              <a:t>AMS/PMS</a:t>
-            </a:r>
-            <a:r>
-              <a:rPr kumimoji="1" lang="ja-JP" altLang="en-US" dirty="0"/>
-              <a:t>だけでなく、</a:t>
-            </a:r>
-            <a:r>
-              <a:rPr kumimoji="1" lang="en-US" altLang="ja-JP" dirty="0"/>
-              <a:t>ALG</a:t>
-            </a:r>
-            <a:r>
-              <a:rPr kumimoji="1" lang="ja-JP" altLang="en-US" dirty="0"/>
-              <a:t>なども記載できます。</a:t>
-            </a:r>
-            <a:endParaRPr kumimoji="1" lang="en-US" altLang="ja-JP" dirty="0"/>
-          </a:p>
-          <a:p>
-            <a:pPr algn="ctr"/>
-            <a:r>
-              <a:rPr kumimoji="1" lang="ja-JP" altLang="en-US" dirty="0"/>
-              <a:t>複数のレジスタを同時に変更したい場合は、カンマで区切っていれてください。</a:t>
-            </a:r>
-            <a:endParaRPr kumimoji="1" lang="en-US" altLang="ja-JP" dirty="0"/>
-          </a:p>
-          <a:p>
-            <a:pPr algn="ctr"/>
-            <a:endParaRPr kumimoji="1" lang="ja-JP" altLang="en-US" dirty="0"/>
-          </a:p>
-        </p:txBody>
-      </p:sp>
-    </p:spTree>
-    <p:extLst>
-      <p:ext uri="{BB962C8B-B14F-4D97-AF65-F5344CB8AC3E}">
-        <p14:creationId xmlns:p14="http://schemas.microsoft.com/office/powerpoint/2010/main" val="1712738226"/>
       </p:ext>
     </p:extLst>
   </p:cSld>

</xml_diff>